<commit_message>
Updated the deck to add a slide about embeddings
</commit_message>
<xml_diff>
--- a/OpenAI_Cosmos_DB_Tech_Scenario_Attendee_Coach_Deck.pptx
+++ b/OpenAI_Cosmos_DB_Tech_Scenario_Attendee_Coach_Deck.pptx
@@ -5,10 +5,10 @@
     <p:sldMasterId id="2147483878" r:id="rId4"/>
   </p:sldMasterIdLst>
   <p:notesMasterIdLst>
-    <p:notesMasterId r:id="rId26"/>
+    <p:notesMasterId r:id="rId27"/>
   </p:notesMasterIdLst>
   <p:handoutMasterIdLst>
-    <p:handoutMasterId r:id="rId27"/>
+    <p:handoutMasterId r:id="rId28"/>
   </p:handoutMasterIdLst>
   <p:sldIdLst>
     <p:sldId id="2076136285" r:id="rId5"/>
@@ -18,20 +18,21 @@
     <p:sldId id="2076136296" r:id="rId9"/>
     <p:sldId id="2076136298" r:id="rId10"/>
     <p:sldId id="2076136277" r:id="rId11"/>
-    <p:sldId id="2076136275" r:id="rId12"/>
-    <p:sldId id="2076136279" r:id="rId13"/>
-    <p:sldId id="2076136286" r:id="rId14"/>
-    <p:sldId id="2076136287" r:id="rId15"/>
-    <p:sldId id="2076136288" r:id="rId16"/>
-    <p:sldId id="2076136289" r:id="rId17"/>
-    <p:sldId id="2076136290" r:id="rId18"/>
-    <p:sldId id="2076136291" r:id="rId19"/>
-    <p:sldId id="2076136292" r:id="rId20"/>
-    <p:sldId id="2076136293" r:id="rId21"/>
-    <p:sldId id="2076136294" r:id="rId22"/>
-    <p:sldId id="2076136299" r:id="rId23"/>
-    <p:sldId id="2076136280" r:id="rId24"/>
-    <p:sldId id="2076136284" r:id="rId25"/>
+    <p:sldId id="2076136300" r:id="rId12"/>
+    <p:sldId id="2076136275" r:id="rId13"/>
+    <p:sldId id="2076136279" r:id="rId14"/>
+    <p:sldId id="2076136286" r:id="rId15"/>
+    <p:sldId id="2076136287" r:id="rId16"/>
+    <p:sldId id="2076136288" r:id="rId17"/>
+    <p:sldId id="2076136289" r:id="rId18"/>
+    <p:sldId id="2076136290" r:id="rId19"/>
+    <p:sldId id="2076136291" r:id="rId20"/>
+    <p:sldId id="2076136292" r:id="rId21"/>
+    <p:sldId id="2076136293" r:id="rId22"/>
+    <p:sldId id="2076136294" r:id="rId23"/>
+    <p:sldId id="2076136299" r:id="rId24"/>
+    <p:sldId id="2076136280" r:id="rId25"/>
+    <p:sldId id="2076136284" r:id="rId26"/>
   </p:sldIdLst>
   <p:sldSz cx="12192000" cy="6858000"/>
   <p:notesSz cx="6858000" cy="9144000"/>
@@ -146,6 +147,7 @@
             <p14:sldId id="2076136296"/>
             <p14:sldId id="2076136298"/>
             <p14:sldId id="2076136277"/>
+            <p14:sldId id="2076136300"/>
             <p14:sldId id="2076136275"/>
           </p14:sldIdLst>
         </p14:section>
@@ -301,7 +303,7 @@
           <a:p>
             <a:fld id="{5DC6FE6B-C416-4AB4-9C30-FB2A7099CAC6}" type="datetimeFigureOut">
               <a:rPr lang="en-US" smtClean="0"/>
-              <a:t>6/27/2023</a:t>
+              <a:t>6/28/2023</a:t>
             </a:fld>
             <a:endParaRPr lang="en-US"/>
           </a:p>
@@ -478,7 +480,7 @@
           <a:p>
             <a:fld id="{CFF76AD5-84B7-47FE-802A-FFAE792CDC84}" type="datetimeFigureOut">
               <a:rPr lang="en-US" smtClean="0"/>
-              <a:t>6/27/2023</a:t>
+              <a:t>6/28/2023</a:t>
             </a:fld>
             <a:endParaRPr lang="en-US"/>
           </a:p>
@@ -912,7 +914,7 @@
                 <a:effectLst/>
                 <a:latin typeface="Calibri Light" panose="020F0302020204030204" pitchFamily="34" charset="0"/>
               </a:rPr>
-              <a:t>Challenge 7: Knowledge preservation</a:t>
+              <a:t>Challenge 6: The Search for Relevance</a:t>
             </a:r>
             <a:r>
               <a:rPr lang="en-US" sz="1800" b="0" i="0" dirty="0">
@@ -942,7 +944,7 @@
                 <a:effectLst/>
                 <a:latin typeface="Calibri" panose="020F0502020204030204" pitchFamily="34" charset="0"/>
               </a:rPr>
-              <a:t>In this challenge, you will modify the index skillset to generate </a:t>
+              <a:t>In this challenge, you will create return search results based on synonyms and display suggestions and autocomplete options.</a:t>
             </a:r>
             <a:r>
               <a:rPr lang="en-US" sz="1800" b="0" i="0" dirty="0">
@@ -952,17 +954,7 @@
                 <a:effectLst/>
                 <a:latin typeface="Segoe UI" panose="020B0502040204020203" pitchFamily="34" charset="0"/>
               </a:rPr>
-              <a:t>knowledge</a:t>
-            </a:r>
-            <a:r>
-              <a:rPr lang="en-US" sz="1800" b="0" i="0" dirty="0">
-                <a:solidFill>
-                  <a:srgbClr val="000000"/>
-                </a:solidFill>
-                <a:effectLst/>
-                <a:latin typeface="Calibri" panose="020F0502020204030204" pitchFamily="34" charset="0"/>
-              </a:rPr>
-              <a:t> store assets. Browse the blobs and tables in the knowledge store using the Storage Explorer interface.  </a:t>
+              <a:t>  </a:t>
             </a:r>
             <a:endParaRPr lang="en-US" b="0" i="0" dirty="0">
               <a:solidFill>
@@ -1005,7 +997,39 @@
                 <a:effectLst/>
                 <a:latin typeface="Calibri" panose="020F0502020204030204" pitchFamily="34" charset="0"/>
               </a:rPr>
-              <a:t>Implement knowledge stores. </a:t>
+              <a:t>Add Synonyms to Azure Search index to ensure relevant results </a:t>
+            </a:r>
+          </a:p>
+          <a:p>
+            <a:pPr algn="l" rtl="0" fontAlgn="base">
+              <a:buFont typeface="Arial" panose="020B0604020202020204" pitchFamily="34" charset="0"/>
+              <a:buChar char="•"/>
+            </a:pPr>
+            <a:r>
+              <a:rPr lang="en-US" sz="1800" b="0" i="0" dirty="0">
+                <a:solidFill>
+                  <a:srgbClr val="000000"/>
+                </a:solidFill>
+                <a:effectLst/>
+                <a:latin typeface="Calibri" panose="020F0502020204030204" pitchFamily="34" charset="0"/>
+              </a:rPr>
+              <a:t>Implement query suggestions / autocomplete </a:t>
+            </a:r>
+          </a:p>
+          <a:p>
+            <a:pPr algn="l" rtl="0" fontAlgn="base">
+              <a:buFont typeface="Arial" panose="020B0604020202020204" pitchFamily="34" charset="0"/>
+              <a:buChar char="•"/>
+            </a:pPr>
+            <a:r>
+              <a:rPr lang="en-US" sz="1800" b="0" i="0" dirty="0">
+                <a:solidFill>
+                  <a:srgbClr val="000000"/>
+                </a:solidFill>
+                <a:effectLst/>
+                <a:latin typeface="Calibri" panose="020F0502020204030204" pitchFamily="34" charset="0"/>
+              </a:rPr>
+              <a:t>Add scoring profiles that boost documents in results </a:t>
             </a:r>
           </a:p>
           <a:p>
@@ -1102,7 +1126,7 @@
                 <a:effectLst/>
                 <a:latin typeface="Calibri Light" panose="020F0302020204030204" pitchFamily="34" charset="0"/>
               </a:rPr>
-              <a:t>Challenge 8: Finding Your Form</a:t>
+              <a:t>Challenge 7: Knowledge preservation</a:t>
             </a:r>
             <a:r>
               <a:rPr lang="en-US" sz="1800" b="0" i="0" dirty="0">
@@ -1132,7 +1156,7 @@
                 <a:effectLst/>
                 <a:latin typeface="Calibri" panose="020F0502020204030204" pitchFamily="34" charset="0"/>
               </a:rPr>
-              <a:t>In this challenge, you will train a Form Recognizer model</a:t>
+              <a:t>In this challenge, you will modify the index skillset to generate </a:t>
             </a:r>
             <a:r>
               <a:rPr lang="en-US" sz="1800" b="0" i="0" dirty="0">
@@ -1140,9 +1164,9 @@
                   <a:srgbClr val="000000"/>
                 </a:solidFill>
                 <a:effectLst/>
-                <a:latin typeface="游明朝" panose="02020400000000000000" pitchFamily="18" charset="-128"/>
+                <a:latin typeface="Segoe UI" panose="020B0502040204020203" pitchFamily="34" charset="0"/>
               </a:rPr>
-              <a:t> </a:t>
+              <a:t>knowledge</a:t>
             </a:r>
             <a:r>
               <a:rPr lang="en-US" sz="1800" b="0" i="0" dirty="0">
@@ -1152,7 +1176,7 @@
                 <a:effectLst/>
                 <a:latin typeface="Calibri" panose="020F0502020204030204" pitchFamily="34" charset="0"/>
               </a:rPr>
-              <a:t>and integrate into a new Azure Search index.  </a:t>
+              <a:t> store assets. Browse the blobs and tables in the knowledge store using the Storage Explorer interface.  </a:t>
             </a:r>
             <a:endParaRPr lang="en-US" b="0" i="0" dirty="0">
               <a:solidFill>
@@ -1195,7 +1219,7 @@
                 <a:effectLst/>
                 <a:latin typeface="Calibri" panose="020F0502020204030204" pitchFamily="34" charset="0"/>
               </a:rPr>
-              <a:t>Create a custom skill that calls the Forms Understanding Service </a:t>
+              <a:t>Implement knowledge stores. </a:t>
             </a:r>
           </a:p>
           <a:p>
@@ -1292,7 +1316,7 @@
                 <a:effectLst/>
                 <a:latin typeface="Calibri Light" panose="020F0302020204030204" pitchFamily="34" charset="0"/>
               </a:rPr>
-              <a:t>Challenge 9: Use Your Intelligence</a:t>
+              <a:t>Challenge 8: Finding Your Form</a:t>
             </a:r>
             <a:r>
               <a:rPr lang="en-US" sz="1800" b="0" i="0" dirty="0">
@@ -1322,7 +1346,27 @@
                 <a:effectLst/>
                 <a:latin typeface="Calibri" panose="020F0502020204030204" pitchFamily="34" charset="0"/>
               </a:rPr>
-              <a:t>In this challenge, you will publish a machine learning model as a web service to predict claim probability.  </a:t>
+              <a:t>In this challenge, you will train a Form Recognizer model</a:t>
+            </a:r>
+            <a:r>
+              <a:rPr lang="en-US" sz="1800" b="0" i="0" dirty="0">
+                <a:solidFill>
+                  <a:srgbClr val="000000"/>
+                </a:solidFill>
+                <a:effectLst/>
+                <a:latin typeface="游明朝" panose="02020400000000000000" pitchFamily="18" charset="-128"/>
+              </a:rPr>
+              <a:t> </a:t>
+            </a:r>
+            <a:r>
+              <a:rPr lang="en-US" sz="1800" b="0" i="0" dirty="0">
+                <a:solidFill>
+                  <a:srgbClr val="000000"/>
+                </a:solidFill>
+                <a:effectLst/>
+                <a:latin typeface="Calibri" panose="020F0502020204030204" pitchFamily="34" charset="0"/>
+              </a:rPr>
+              <a:t>and integrate into a new Azure Search index.  </a:t>
             </a:r>
             <a:endParaRPr lang="en-US" b="0" i="0" dirty="0">
               <a:solidFill>
@@ -1365,7 +1409,7 @@
                 <a:effectLst/>
                 <a:latin typeface="Calibri" panose="020F0502020204030204" pitchFamily="34" charset="0"/>
               </a:rPr>
-              <a:t>Build a custom skill that consumes a custom machine learning model </a:t>
+              <a:t>Create a custom skill that calls the Forms Understanding Service </a:t>
             </a:r>
           </a:p>
           <a:p>
@@ -1391,6 +1435,176 @@
             <a:fld id="{CCB0B7A7-645F-45EF-A82D-25C8E51FB344}" type="slidenum">
               <a:rPr lang="en-US" smtClean="0"/>
               <a:t>18</a:t>
+            </a:fld>
+            <a:endParaRPr lang="en-US"/>
+          </a:p>
+        </p:txBody>
+      </p:sp>
+    </p:spTree>
+    <p:extLst>
+      <p:ext uri="{BB962C8B-B14F-4D97-AF65-F5344CB8AC3E}">
+        <p14:creationId xmlns:p14="http://schemas.microsoft.com/office/powerpoint/2010/main" val="3706595812"/>
+      </p:ext>
+    </p:extLst>
+  </p:cSld>
+  <p:clrMapOvr>
+    <a:masterClrMapping/>
+  </p:clrMapOvr>
+</p:notes>
+</file>
+
+<file path=ppt/notesSlides/notesSlide13.xml><?xml version="1.0" encoding="utf-8"?>
+<p:notes xmlns:a="http://schemas.openxmlformats.org/drawingml/2006/main" xmlns:r="http://schemas.openxmlformats.org/officeDocument/2006/relationships" xmlns:p="http://schemas.openxmlformats.org/presentationml/2006/main">
+  <p:cSld>
+    <p:spTree>
+      <p:nvGrpSpPr>
+        <p:cNvPr id="1" name=""/>
+        <p:cNvGrpSpPr/>
+        <p:nvPr/>
+      </p:nvGrpSpPr>
+      <p:grpSpPr>
+        <a:xfrm>
+          <a:off x="0" y="0"/>
+          <a:ext cx="0" cy="0"/>
+          <a:chOff x="0" y="0"/>
+          <a:chExt cx="0" cy="0"/>
+        </a:xfrm>
+      </p:grpSpPr>
+      <p:sp>
+        <p:nvSpPr>
+          <p:cNvPr id="2" name="Slide Image Placeholder 1"/>
+          <p:cNvSpPr>
+            <a:spLocks noGrp="1" noRot="1" noChangeAspect="1"/>
+          </p:cNvSpPr>
+          <p:nvPr>
+            <p:ph type="sldImg"/>
+          </p:nvPr>
+        </p:nvSpPr>
+        <p:spPr/>
+      </p:sp>
+      <p:sp>
+        <p:nvSpPr>
+          <p:cNvPr id="3" name="Notes Placeholder 2"/>
+          <p:cNvSpPr>
+            <a:spLocks noGrp="1"/>
+          </p:cNvSpPr>
+          <p:nvPr>
+            <p:ph type="body" idx="1"/>
+          </p:nvPr>
+        </p:nvSpPr>
+        <p:spPr/>
+        <p:txBody>
+          <a:bodyPr/>
+          <a:lstStyle/>
+          <a:p>
+            <a:pPr algn="l" rtl="0" fontAlgn="base"/>
+            <a:r>
+              <a:rPr lang="en-US" sz="1800" b="1" i="0" dirty="0">
+                <a:solidFill>
+                  <a:srgbClr val="000000"/>
+                </a:solidFill>
+                <a:effectLst/>
+                <a:latin typeface="Calibri Light" panose="020F0302020204030204" pitchFamily="34" charset="0"/>
+              </a:rPr>
+              <a:t>Challenge 9: Use Your Intelligence</a:t>
+            </a:r>
+            <a:r>
+              <a:rPr lang="en-US" sz="1800" b="0" i="0" dirty="0">
+                <a:solidFill>
+                  <a:srgbClr val="000000"/>
+                </a:solidFill>
+                <a:effectLst/>
+                <a:latin typeface="Calibri Light" panose="020F0302020204030204" pitchFamily="34" charset="0"/>
+              </a:rPr>
+              <a:t> </a:t>
+            </a:r>
+            <a:endParaRPr lang="en-US" b="0" i="0" dirty="0">
+              <a:solidFill>
+                <a:srgbClr val="000000"/>
+              </a:solidFill>
+              <a:effectLst/>
+              <a:latin typeface="Segoe UI" panose="020B0502040204020203" pitchFamily="34" charset="0"/>
+            </a:endParaRPr>
+          </a:p>
+          <a:p>
+            <a:pPr algn="l" rtl="0" fontAlgn="base"/>
+            <a:r>
+              <a:rPr lang="en-US" sz="1800" b="0" i="0" dirty="0">
+                <a:solidFill>
+                  <a:srgbClr val="000000"/>
+                </a:solidFill>
+                <a:effectLst/>
+                <a:latin typeface="Calibri" panose="020F0502020204030204" pitchFamily="34" charset="0"/>
+              </a:rPr>
+              <a:t>In this challenge, you will publish a machine learning model as a web service to predict claim probability.  </a:t>
+            </a:r>
+            <a:endParaRPr lang="en-US" b="0" i="0" dirty="0">
+              <a:solidFill>
+                <a:srgbClr val="000000"/>
+              </a:solidFill>
+              <a:effectLst/>
+              <a:latin typeface="Segoe UI" panose="020B0502040204020203" pitchFamily="34" charset="0"/>
+            </a:endParaRPr>
+          </a:p>
+          <a:p>
+            <a:pPr algn="l" rtl="0" fontAlgn="base"/>
+            <a:r>
+              <a:rPr lang="en-US" sz="1800" b="0" i="0" dirty="0">
+                <a:solidFill>
+                  <a:srgbClr val="000000"/>
+                </a:solidFill>
+                <a:effectLst/>
+                <a:latin typeface="Calibri Light" panose="020F0302020204030204" pitchFamily="34" charset="0"/>
+              </a:rPr>
+              <a:t>Learning objectives: </a:t>
+            </a:r>
+            <a:endParaRPr lang="en-US" b="0" i="0" dirty="0">
+              <a:solidFill>
+                <a:srgbClr val="000000"/>
+              </a:solidFill>
+              <a:effectLst/>
+              <a:latin typeface="Segoe UI" panose="020B0502040204020203" pitchFamily="34" charset="0"/>
+            </a:endParaRPr>
+          </a:p>
+          <a:p>
+            <a:pPr algn="l" rtl="0" fontAlgn="base">
+              <a:buFont typeface="Arial" panose="020B0604020202020204" pitchFamily="34" charset="0"/>
+              <a:buChar char="•"/>
+            </a:pPr>
+            <a:r>
+              <a:rPr lang="en-US" sz="1800" b="0" i="0" dirty="0">
+                <a:solidFill>
+                  <a:srgbClr val="000000"/>
+                </a:solidFill>
+                <a:effectLst/>
+                <a:latin typeface="Calibri" panose="020F0502020204030204" pitchFamily="34" charset="0"/>
+              </a:rPr>
+              <a:t>Build a custom skill that consumes a custom machine learning model </a:t>
+            </a:r>
+          </a:p>
+          <a:p>
+            <a:endParaRPr lang="en-US" dirty="0"/>
+          </a:p>
+        </p:txBody>
+      </p:sp>
+      <p:sp>
+        <p:nvSpPr>
+          <p:cNvPr id="4" name="Slide Number Placeholder 3"/>
+          <p:cNvSpPr>
+            <a:spLocks noGrp="1"/>
+          </p:cNvSpPr>
+          <p:nvPr>
+            <p:ph type="sldNum" sz="quarter" idx="5"/>
+          </p:nvPr>
+        </p:nvSpPr>
+        <p:spPr/>
+        <p:txBody>
+          <a:bodyPr/>
+          <a:lstStyle/>
+          <a:p>
+            <a:fld id="{CCB0B7A7-645F-45EF-A82D-25C8E51FB344}" type="slidenum">
+              <a:rPr lang="en-US" smtClean="0"/>
+              <a:t>19</a:t>
             </a:fld>
             <a:endParaRPr lang="en-US"/>
           </a:p>
@@ -1453,43 +1667,66 @@
           <a:bodyPr/>
           <a:lstStyle/>
           <a:p>
-            <a:pPr marL="0" marR="0" lvl="0" indent="0" algn="l" defTabSz="914400" rtl="0" eaLnBrk="1" fontAlgn="auto" latinLnBrk="0" hangingPunct="1">
-              <a:lnSpc>
-                <a:spcPct val="100000"/>
-              </a:lnSpc>
-              <a:spcBef>
-                <a:spcPts val="0"/>
-              </a:spcBef>
-              <a:spcAft>
-                <a:spcPts val="0"/>
-              </a:spcAft>
-              <a:buClrTx/>
-              <a:buSzTx/>
-              <a:buFontTx/>
-              <a:buNone/>
-              <a:tabLst/>
-              <a:defRPr/>
-            </a:pPr>
-            <a:r>
-              <a:rPr kumimoji="0" lang="en-US" sz="1200" b="0" i="0" u="none" strike="noStrike" kern="1200" cap="none" spc="0" normalizeH="0" baseline="0" noProof="0">
-                <a:ln>
-                  <a:noFill/>
-                </a:ln>
+            <a:pPr algn="l"/>
+            <a:r>
+              <a:rPr lang="en-US" b="0" i="0" dirty="0">
                 <a:solidFill>
-                  <a:srgbClr val="FFFFFF"/>
+                  <a:srgbClr val="D1D5DB"/>
                 </a:solidFill>
                 <a:effectLst/>
-                <a:uLnTx/>
-                <a:uFillTx/>
-                <a:latin typeface="Segoe UI" panose="020B0502040204020203" pitchFamily="34" charset="0"/>
-                <a:ea typeface="+mn-ea"/>
-                <a:cs typeface="Segoe UI" panose="020B0502040204020203" pitchFamily="34" charset="0"/>
+                <a:latin typeface="Söhne"/>
               </a:rPr>
-              <a:t>To get started, visit the OpenHack portal:</a:t>
-            </a:r>
-          </a:p>
-          <a:p>
-            <a:endParaRPr lang="en-US"/>
+              <a:t>Embeddings are a method of representing words or data as vectors in a high-dimensional space. Vectors are mathematical entities that resemble arrows, having both direction and length. In this context, high-dimensional means that the space has numerous dimensions beyond what we can perceive. Embeddings aim to assign similar words or data with similar vectors, while different words or data are assigned different vectors. This allows us to measure the relatedness or unrelatedness of words or data and perform various operations on them, such as addition, subtraction, and multiplication. Embeddings are particularly valuable for AI models as they enable computers to comprehend and process the meaning and context of words or data.</a:t>
+            </a:r>
+          </a:p>
+          <a:p>
+            <a:pPr algn="l"/>
+            <a:endParaRPr lang="en-US" b="0" i="0" dirty="0">
+              <a:solidFill>
+                <a:srgbClr val="D1D5DB"/>
+              </a:solidFill>
+              <a:effectLst/>
+              <a:latin typeface="Söhne"/>
+            </a:endParaRPr>
+          </a:p>
+          <a:p>
+            <a:pPr algn="l"/>
+            <a:r>
+              <a:rPr lang="en-US" b="0" i="0" dirty="0">
+                <a:solidFill>
+                  <a:srgbClr val="D1D5DB"/>
+                </a:solidFill>
+                <a:effectLst/>
+                <a:latin typeface="Söhne"/>
+              </a:rPr>
+              <a:t>To utilize embeddings, a sentence, paragraph, or page of text is transformed into an embedding vector. When a search query is conducted, it is converted into its corresponding embedding representation. Then, a search is performed among the existing embedding vectors to find the most similar ones. This process resembles making a search query on a search engine, which provides multiple results that are closely related to the query. Semantic memory may not yield an exact match, but it will always provide a set of matches ranked based on how similar the query is to other text pieces.</a:t>
+            </a:r>
+          </a:p>
+          <a:p>
+            <a:pPr algn="l"/>
+            <a:endParaRPr lang="en-US" b="0" i="0" dirty="0">
+              <a:solidFill>
+                <a:srgbClr val="D1D5DB"/>
+              </a:solidFill>
+              <a:effectLst/>
+              <a:latin typeface="Söhne"/>
+            </a:endParaRPr>
+          </a:p>
+          <a:p>
+            <a:pPr algn="l"/>
+            <a:r>
+              <a:rPr lang="en-US" b="0" i="0" dirty="0">
+                <a:solidFill>
+                  <a:srgbClr val="D1D5DB"/>
+                </a:solidFill>
+                <a:effectLst/>
+                <a:latin typeface="Söhne"/>
+              </a:rPr>
+              <a:t>Azure OpenAI embeddings employ cosine similarity to calculate the similarity between documents and a query. Cosine similarity measures the cosine of the angle between two vectors projected in a multi-dimensional space. This approach is advantageous because even if two documents are far apart in terms of Euclidean distance due to their size, they may still exhibit a smaller angle between them, resulting in higher cosine similarity.</a:t>
+            </a:r>
+          </a:p>
+          <a:p>
+            <a:endParaRPr lang="en-US" dirty="0"/>
           </a:p>
         </p:txBody>
       </p:sp>
@@ -1508,78 +1745,18 @@
           <a:bodyPr/>
           <a:lstStyle/>
           <a:p>
-            <a:pPr marL="0" marR="0" lvl="0" indent="0" algn="r" defTabSz="914400" rtl="0" eaLnBrk="1" fontAlgn="auto" latinLnBrk="0" hangingPunct="1">
-              <a:lnSpc>
-                <a:spcPct val="100000"/>
-              </a:lnSpc>
-              <a:spcBef>
-                <a:spcPts val="0"/>
-              </a:spcBef>
-              <a:spcAft>
-                <a:spcPts val="0"/>
-              </a:spcAft>
-              <a:buClrTx/>
-              <a:buSzTx/>
-              <a:buFontTx/>
-              <a:buNone/>
-              <a:tabLst/>
-              <a:defRPr/>
-            </a:pPr>
-            <a:fld id="{96C4A558-2D39-4963-801C-D8D0AB93CA23}" type="slidenum">
-              <a:rPr kumimoji="0" lang="en-NZ" sz="1200" b="0" i="0" u="none" strike="noStrike" kern="1200" cap="none" spc="0" normalizeH="0" baseline="0" noProof="0" smtClean="0">
-                <a:ln>
-                  <a:noFill/>
-                </a:ln>
-                <a:solidFill>
-                  <a:prstClr val="black"/>
-                </a:solidFill>
-                <a:effectLst/>
-                <a:uLnTx/>
-                <a:uFillTx/>
-                <a:latin typeface="Calibri" panose="020F0502020204030204"/>
-                <a:ea typeface="+mn-ea"/>
-                <a:cs typeface="+mn-cs"/>
-              </a:rPr>
-              <a:pPr marL="0" marR="0" lvl="0" indent="0" algn="r" defTabSz="914400" rtl="0" eaLnBrk="1" fontAlgn="auto" latinLnBrk="0" hangingPunct="1">
-                <a:lnSpc>
-                  <a:spcPct val="100000"/>
-                </a:lnSpc>
-                <a:spcBef>
-                  <a:spcPts val="0"/>
-                </a:spcBef>
-                <a:spcAft>
-                  <a:spcPts val="0"/>
-                </a:spcAft>
-                <a:buClrTx/>
-                <a:buSzTx/>
-                <a:buFontTx/>
-                <a:buNone/>
-                <a:tabLst/>
-                <a:defRPr/>
-              </a:pPr>
+            <a:fld id="{CCB0B7A7-645F-45EF-A82D-25C8E51FB344}" type="slidenum">
+              <a:rPr lang="en-US" smtClean="0"/>
               <a:t>8</a:t>
             </a:fld>
-            <a:endParaRPr kumimoji="0" lang="en-NZ" sz="1200" b="0" i="0" u="none" strike="noStrike" kern="1200" cap="none" spc="0" normalizeH="0" baseline="0" noProof="0">
-              <a:ln>
-                <a:noFill/>
-              </a:ln>
-              <a:solidFill>
-                <a:prstClr val="black"/>
-              </a:solidFill>
-              <a:effectLst/>
-              <a:uLnTx/>
-              <a:uFillTx/>
-              <a:latin typeface="Calibri" panose="020F0502020204030204"/>
-              <a:ea typeface="+mn-ea"/>
-              <a:cs typeface="+mn-cs"/>
-            </a:endParaRPr>
+            <a:endParaRPr lang="en-US"/>
           </a:p>
         </p:txBody>
       </p:sp>
     </p:spTree>
     <p:extLst>
       <p:ext uri="{BB962C8B-B14F-4D97-AF65-F5344CB8AC3E}">
-        <p14:creationId xmlns:p14="http://schemas.microsoft.com/office/powerpoint/2010/main" val="380937796"/>
+        <p14:creationId xmlns:p14="http://schemas.microsoft.com/office/powerpoint/2010/main" val="1097279104"/>
       </p:ext>
     </p:extLst>
   </p:cSld>
@@ -1633,10 +1810,43 @@
           <a:bodyPr/>
           <a:lstStyle/>
           <a:p>
-            <a:r>
-              <a:rPr lang="en-US"/>
-              <a:t>This guide is only meant to be a reference. Please do not rely on this guide in place of completing the challenges before coaching. </a:t>
-            </a:r>
+            <a:pPr marL="0" marR="0" lvl="0" indent="0" algn="l" defTabSz="914400" rtl="0" eaLnBrk="1" fontAlgn="auto" latinLnBrk="0" hangingPunct="1">
+              <a:lnSpc>
+                <a:spcPct val="100000"/>
+              </a:lnSpc>
+              <a:spcBef>
+                <a:spcPts val="0"/>
+              </a:spcBef>
+              <a:spcAft>
+                <a:spcPts val="0"/>
+              </a:spcAft>
+              <a:buClrTx/>
+              <a:buSzTx/>
+              <a:buFontTx/>
+              <a:buNone/>
+              <a:tabLst/>
+              <a:defRPr/>
+            </a:pPr>
+            <a:r>
+              <a:rPr kumimoji="0" lang="en-US" sz="1200" b="0" i="0" u="none" strike="noStrike" kern="1200" cap="none" spc="0" normalizeH="0" baseline="0" noProof="0">
+                <a:ln>
+                  <a:noFill/>
+                </a:ln>
+                <a:solidFill>
+                  <a:srgbClr val="FFFFFF"/>
+                </a:solidFill>
+                <a:effectLst/>
+                <a:uLnTx/>
+                <a:uFillTx/>
+                <a:latin typeface="Segoe UI" panose="020B0502040204020203" pitchFamily="34" charset="0"/>
+                <a:ea typeface="+mn-ea"/>
+                <a:cs typeface="Segoe UI" panose="020B0502040204020203" pitchFamily="34" charset="0"/>
+              </a:rPr>
+              <a:t>To get started, visit the OpenHack portal:</a:t>
+            </a:r>
+          </a:p>
+          <a:p>
+            <a:endParaRPr lang="en-US"/>
           </a:p>
         </p:txBody>
       </p:sp>
@@ -1655,18 +1865,78 @@
           <a:bodyPr/>
           <a:lstStyle/>
           <a:p>
-            <a:fld id="{B14F9875-39BF-4C18-A21D-3E04A24EDC12}" type="slidenum">
-              <a:rPr lang="en-US" smtClean="0"/>
+            <a:pPr marL="0" marR="0" lvl="0" indent="0" algn="r" defTabSz="914400" rtl="0" eaLnBrk="1" fontAlgn="auto" latinLnBrk="0" hangingPunct="1">
+              <a:lnSpc>
+                <a:spcPct val="100000"/>
+              </a:lnSpc>
+              <a:spcBef>
+                <a:spcPts val="0"/>
+              </a:spcBef>
+              <a:spcAft>
+                <a:spcPts val="0"/>
+              </a:spcAft>
+              <a:buClrTx/>
+              <a:buSzTx/>
+              <a:buFontTx/>
+              <a:buNone/>
+              <a:tabLst/>
+              <a:defRPr/>
+            </a:pPr>
+            <a:fld id="{96C4A558-2D39-4963-801C-D8D0AB93CA23}" type="slidenum">
+              <a:rPr kumimoji="0" lang="en-NZ" sz="1200" b="0" i="0" u="none" strike="noStrike" kern="1200" cap="none" spc="0" normalizeH="0" baseline="0" noProof="0" smtClean="0">
+                <a:ln>
+                  <a:noFill/>
+                </a:ln>
+                <a:solidFill>
+                  <a:prstClr val="black"/>
+                </a:solidFill>
+                <a:effectLst/>
+                <a:uLnTx/>
+                <a:uFillTx/>
+                <a:latin typeface="Calibri" panose="020F0502020204030204"/>
+                <a:ea typeface="+mn-ea"/>
+                <a:cs typeface="+mn-cs"/>
+              </a:rPr>
+              <a:pPr marL="0" marR="0" lvl="0" indent="0" algn="r" defTabSz="914400" rtl="0" eaLnBrk="1" fontAlgn="auto" latinLnBrk="0" hangingPunct="1">
+                <a:lnSpc>
+                  <a:spcPct val="100000"/>
+                </a:lnSpc>
+                <a:spcBef>
+                  <a:spcPts val="0"/>
+                </a:spcBef>
+                <a:spcAft>
+                  <a:spcPts val="0"/>
+                </a:spcAft>
+                <a:buClrTx/>
+                <a:buSzTx/>
+                <a:buFontTx/>
+                <a:buNone/>
+                <a:tabLst/>
+                <a:defRPr/>
+              </a:pPr>
               <a:t>9</a:t>
             </a:fld>
-            <a:endParaRPr lang="en-US"/>
+            <a:endParaRPr kumimoji="0" lang="en-NZ" sz="1200" b="0" i="0" u="none" strike="noStrike" kern="1200" cap="none" spc="0" normalizeH="0" baseline="0" noProof="0">
+              <a:ln>
+                <a:noFill/>
+              </a:ln>
+              <a:solidFill>
+                <a:prstClr val="black"/>
+              </a:solidFill>
+              <a:effectLst/>
+              <a:uLnTx/>
+              <a:uFillTx/>
+              <a:latin typeface="Calibri" panose="020F0502020204030204"/>
+              <a:ea typeface="+mn-ea"/>
+              <a:cs typeface="+mn-cs"/>
+            </a:endParaRPr>
           </a:p>
         </p:txBody>
       </p:sp>
     </p:spTree>
     <p:extLst>
       <p:ext uri="{BB962C8B-B14F-4D97-AF65-F5344CB8AC3E}">
-        <p14:creationId xmlns:p14="http://schemas.microsoft.com/office/powerpoint/2010/main" val="1691727235"/>
+        <p14:creationId xmlns:p14="http://schemas.microsoft.com/office/powerpoint/2010/main" val="380937796"/>
       </p:ext>
     </p:extLst>
   </p:cSld>
@@ -1720,7 +1990,10 @@
           <a:bodyPr/>
           <a:lstStyle/>
           <a:p>
-            <a:endParaRPr lang="en-US" dirty="0"/>
+            <a:r>
+              <a:rPr lang="en-US"/>
+              <a:t>This guide is only meant to be a reference. Please do not rely on this guide in place of completing the challenges before coaching. </a:t>
+            </a:r>
           </a:p>
         </p:txBody>
       </p:sp>
@@ -1739,7 +2012,7 @@
           <a:bodyPr/>
           <a:lstStyle/>
           <a:p>
-            <a:fld id="{CCB0B7A7-645F-45EF-A82D-25C8E51FB344}" type="slidenum">
+            <a:fld id="{B14F9875-39BF-4C18-A21D-3E04A24EDC12}" type="slidenum">
               <a:rPr lang="en-US" smtClean="0"/>
               <a:t>10</a:t>
             </a:fld>
@@ -1750,7 +2023,7 @@
     </p:spTree>
     <p:extLst>
       <p:ext uri="{BB962C8B-B14F-4D97-AF65-F5344CB8AC3E}">
-        <p14:creationId xmlns:p14="http://schemas.microsoft.com/office/powerpoint/2010/main" val="3706595812"/>
+        <p14:creationId xmlns:p14="http://schemas.microsoft.com/office/powerpoint/2010/main" val="1691727235"/>
       </p:ext>
     </p:extLst>
   </p:cSld>
@@ -1888,140 +2161,6 @@
           <a:bodyPr/>
           <a:lstStyle/>
           <a:p>
-            <a:pPr algn="l" rtl="0" fontAlgn="base"/>
-            <a:r>
-              <a:rPr lang="en-US" sz="1800" b="1" i="0" dirty="0">
-                <a:solidFill>
-                  <a:srgbClr val="000000"/>
-                </a:solidFill>
-                <a:effectLst/>
-                <a:latin typeface="Calibri Light" panose="020F0302020204030204" pitchFamily="34" charset="0"/>
-              </a:rPr>
-              <a:t>Challenge 3: Expanding the Search</a:t>
-            </a:r>
-            <a:r>
-              <a:rPr lang="en-US" sz="1800" b="0" i="0" dirty="0">
-                <a:solidFill>
-                  <a:srgbClr val="000000"/>
-                </a:solidFill>
-                <a:effectLst/>
-                <a:latin typeface="Calibri Light" panose="020F0302020204030204" pitchFamily="34" charset="0"/>
-              </a:rPr>
-              <a:t> </a:t>
-            </a:r>
-            <a:endParaRPr lang="en-US" b="0" i="0" dirty="0">
-              <a:solidFill>
-                <a:srgbClr val="000000"/>
-              </a:solidFill>
-              <a:effectLst/>
-              <a:latin typeface="Segoe UI" panose="020B0502040204020203" pitchFamily="34" charset="0"/>
-            </a:endParaRPr>
-          </a:p>
-          <a:p>
-            <a:pPr algn="l" rtl="0" fontAlgn="base"/>
-            <a:r>
-              <a:rPr lang="en-US" sz="1800" b="0" i="0" dirty="0">
-                <a:solidFill>
-                  <a:srgbClr val="000000"/>
-                </a:solidFill>
-                <a:effectLst/>
-                <a:latin typeface="Calibri" panose="020F0502020204030204" pitchFamily="34" charset="0"/>
-              </a:rPr>
-              <a:t>In this challenge, you will Update the index and demonstrate code that successfully retrieves information.  </a:t>
-            </a:r>
-            <a:endParaRPr lang="en-US" b="0" i="0" dirty="0">
-              <a:solidFill>
-                <a:srgbClr val="000000"/>
-              </a:solidFill>
-              <a:effectLst/>
-              <a:latin typeface="Segoe UI" panose="020B0502040204020203" pitchFamily="34" charset="0"/>
-            </a:endParaRPr>
-          </a:p>
-          <a:p>
-            <a:pPr algn="l" rtl="0" fontAlgn="base"/>
-            <a:r>
-              <a:rPr lang="en-US" sz="1800" b="0" i="0" dirty="0">
-                <a:solidFill>
-                  <a:srgbClr val="000000"/>
-                </a:solidFill>
-                <a:effectLst/>
-                <a:latin typeface="Calibri Light" panose="020F0302020204030204" pitchFamily="34" charset="0"/>
-              </a:rPr>
-              <a:t>Learning objectives: </a:t>
-            </a:r>
-            <a:endParaRPr lang="en-US" b="0" i="0" dirty="0">
-              <a:solidFill>
-                <a:srgbClr val="000000"/>
-              </a:solidFill>
-              <a:effectLst/>
-              <a:latin typeface="Segoe UI" panose="020B0502040204020203" pitchFamily="34" charset="0"/>
-            </a:endParaRPr>
-          </a:p>
-          <a:p>
-            <a:pPr algn="l" rtl="0" fontAlgn="base">
-              <a:buFont typeface="Arial" panose="020B0604020202020204" pitchFamily="34" charset="0"/>
-              <a:buChar char="•"/>
-            </a:pPr>
-            <a:r>
-              <a:rPr lang="en-US" sz="1800" b="0" i="0" dirty="0">
-                <a:solidFill>
-                  <a:srgbClr val="000000"/>
-                </a:solidFill>
-                <a:effectLst/>
-                <a:latin typeface="Calibri" panose="020F0502020204030204" pitchFamily="34" charset="0"/>
-              </a:rPr>
-              <a:t>Add built-in cognitive skills to an Azure Search index to return: </a:t>
-            </a:r>
-          </a:p>
-          <a:p>
-            <a:pPr algn="l" rtl="0" fontAlgn="base">
-              <a:buFont typeface="Arial" panose="020B0604020202020204" pitchFamily="34" charset="0"/>
-              <a:buChar char="•"/>
-            </a:pPr>
-            <a:r>
-              <a:rPr lang="en-US" sz="1800" b="0" i="0" dirty="0">
-                <a:solidFill>
-                  <a:srgbClr val="000000"/>
-                </a:solidFill>
-                <a:effectLst/>
-                <a:latin typeface="Calibri" panose="020F0502020204030204" pitchFamily="34" charset="0"/>
-              </a:rPr>
-              <a:t>Key Phrases </a:t>
-            </a:r>
-          </a:p>
-          <a:p>
-            <a:pPr algn="l" rtl="0" fontAlgn="base">
-              <a:buFont typeface="Arial" panose="020B0604020202020204" pitchFamily="34" charset="0"/>
-              <a:buChar char="•"/>
-            </a:pPr>
-            <a:r>
-              <a:rPr lang="en-US" sz="1800" b="0" i="0" dirty="0">
-                <a:solidFill>
-                  <a:srgbClr val="000000"/>
-                </a:solidFill>
-                <a:effectLst/>
-                <a:latin typeface="Calibri" panose="020F0502020204030204" pitchFamily="34" charset="0"/>
-              </a:rPr>
-              <a:t>Entities (including links) </a:t>
-            </a:r>
-          </a:p>
-          <a:p>
-            <a:pPr algn="l" rtl="0" fontAlgn="base">
-              <a:buFont typeface="Arial" panose="020B0604020202020204" pitchFamily="34" charset="0"/>
-              <a:buChar char="•"/>
-            </a:pPr>
-            <a:r>
-              <a:rPr lang="en-US" sz="1800" b="0" i="0" dirty="0">
-                <a:solidFill>
-                  <a:srgbClr val="000000"/>
-                </a:solidFill>
-                <a:effectLst/>
-                <a:latin typeface="Calibri" panose="020F0502020204030204" pitchFamily="34" charset="0"/>
-              </a:rPr>
-              <a:t>Sentiment (especially reviews) </a:t>
-            </a:r>
-          </a:p>
-          <a:p>
             <a:endParaRPr lang="en-US" dirty="0"/>
           </a:p>
         </p:txBody>
@@ -2115,7 +2254,7 @@
                 <a:effectLst/>
                 <a:latin typeface="Calibri Light" panose="020F0302020204030204" pitchFamily="34" charset="0"/>
               </a:rPr>
-              <a:t>Challenge 4: Getting the Full Picture</a:t>
+              <a:t>Challenge 3: Expanding the Search</a:t>
             </a:r>
             <a:r>
               <a:rPr lang="en-US" sz="1800" b="0" i="0" dirty="0">
@@ -2145,7 +2284,7 @@
                 <a:effectLst/>
                 <a:latin typeface="Calibri" panose="020F0502020204030204" pitchFamily="34" charset="0"/>
               </a:rPr>
-              <a:t>In this challenge, you will use the OCR skill to expand the index to extract AI-generated descriptions of images embedded in documents.  </a:t>
+              <a:t>In this challenge, you will Update the index and demonstrate code that successfully retrieves information.  </a:t>
             </a:r>
             <a:endParaRPr lang="en-US" b="0" i="0" dirty="0">
               <a:solidFill>
@@ -2204,7 +2343,7 @@
                 <a:effectLst/>
                 <a:latin typeface="Calibri" panose="020F0502020204030204" pitchFamily="34" charset="0"/>
               </a:rPr>
-              <a:t>Image Descriptions and Tags </a:t>
+              <a:t>Key Phrases </a:t>
             </a:r>
           </a:p>
           <a:p>
@@ -2220,7 +2359,23 @@
                 <a:effectLst/>
                 <a:latin typeface="Calibri" panose="020F0502020204030204" pitchFamily="34" charset="0"/>
               </a:rPr>
-              <a:t>OCR extracted Text </a:t>
+              <a:t>Entities (including links) </a:t>
+            </a:r>
+          </a:p>
+          <a:p>
+            <a:pPr algn="l" rtl="0" fontAlgn="base">
+              <a:buFont typeface="Arial" panose="020B0604020202020204" pitchFamily="34" charset="0"/>
+              <a:buChar char="•"/>
+            </a:pPr>
+            <a:r>
+              <a:rPr lang="en-US" sz="1800" b="0" i="0" dirty="0">
+                <a:solidFill>
+                  <a:srgbClr val="000000"/>
+                </a:solidFill>
+                <a:effectLst/>
+                <a:latin typeface="Calibri" panose="020F0502020204030204" pitchFamily="34" charset="0"/>
+              </a:rPr>
+              <a:t>Sentiment (especially reviews) </a:t>
             </a:r>
           </a:p>
           <a:p>
@@ -2317,7 +2472,7 @@
                 <a:effectLst/>
                 <a:latin typeface="Calibri Light" panose="020F0302020204030204" pitchFamily="34" charset="0"/>
               </a:rPr>
-              <a:t>Challenge 5: What is the Frequency?</a:t>
+              <a:t>Challenge 4: Getting the Full Picture</a:t>
             </a:r>
             <a:r>
               <a:rPr lang="en-US" sz="1800" b="0" i="0" dirty="0">
@@ -2347,7 +2502,7 @@
                 <a:effectLst/>
                 <a:latin typeface="Calibri" panose="020F0502020204030204" pitchFamily="34" charset="0"/>
               </a:rPr>
-              <a:t>In this challenge, you will create a web API custom skill for your Azure Search index. </a:t>
+              <a:t>In this challenge, you will use the OCR skill to expand the index to extract AI-generated descriptions of images embedded in documents.  </a:t>
             </a:r>
             <a:endParaRPr lang="en-US" b="0" i="0" dirty="0">
               <a:solidFill>
@@ -2390,7 +2545,7 @@
                 <a:effectLst/>
                 <a:latin typeface="Calibri" panose="020F0502020204030204" pitchFamily="34" charset="0"/>
               </a:rPr>
-              <a:t>Create a custom skill to find the top ten most frequent words </a:t>
+              <a:t>Add built-in cognitive skills to an Azure Search index to return: </a:t>
             </a:r>
           </a:p>
           <a:p>
@@ -2406,7 +2561,23 @@
                 <a:effectLst/>
                 <a:latin typeface="Calibri" panose="020F0502020204030204" pitchFamily="34" charset="0"/>
               </a:rPr>
-              <a:t>Incorporate your custom skill into your web content index </a:t>
+              <a:t>Image Descriptions and Tags </a:t>
+            </a:r>
+          </a:p>
+          <a:p>
+            <a:pPr algn="l" rtl="0" fontAlgn="base">
+              <a:buFont typeface="Arial" panose="020B0604020202020204" pitchFamily="34" charset="0"/>
+              <a:buChar char="•"/>
+            </a:pPr>
+            <a:r>
+              <a:rPr lang="en-US" sz="1800" b="0" i="0" dirty="0">
+                <a:solidFill>
+                  <a:srgbClr val="000000"/>
+                </a:solidFill>
+                <a:effectLst/>
+                <a:latin typeface="Calibri" panose="020F0502020204030204" pitchFamily="34" charset="0"/>
+              </a:rPr>
+              <a:t>OCR extracted Text </a:t>
             </a:r>
           </a:p>
           <a:p>
@@ -2503,7 +2674,7 @@
                 <a:effectLst/>
                 <a:latin typeface="Calibri Light" panose="020F0302020204030204" pitchFamily="34" charset="0"/>
               </a:rPr>
-              <a:t>Challenge 6: The Search for Relevance</a:t>
+              <a:t>Challenge 5: What is the Frequency?</a:t>
             </a:r>
             <a:r>
               <a:rPr lang="en-US" sz="1800" b="0" i="0" dirty="0">
@@ -2533,17 +2704,7 @@
                 <a:effectLst/>
                 <a:latin typeface="Calibri" panose="020F0502020204030204" pitchFamily="34" charset="0"/>
               </a:rPr>
-              <a:t>In this challenge, you will create return search results based on synonyms and display suggestions and autocomplete options.</a:t>
-            </a:r>
-            <a:r>
-              <a:rPr lang="en-US" sz="1800" b="0" i="0" dirty="0">
-                <a:solidFill>
-                  <a:srgbClr val="000000"/>
-                </a:solidFill>
-                <a:effectLst/>
-                <a:latin typeface="Segoe UI" panose="020B0502040204020203" pitchFamily="34" charset="0"/>
-              </a:rPr>
-              <a:t>  </a:t>
+              <a:t>In this challenge, you will create a web API custom skill for your Azure Search index. </a:t>
             </a:r>
             <a:endParaRPr lang="en-US" b="0" i="0" dirty="0">
               <a:solidFill>
@@ -2586,7 +2747,7 @@
                 <a:effectLst/>
                 <a:latin typeface="Calibri" panose="020F0502020204030204" pitchFamily="34" charset="0"/>
               </a:rPr>
-              <a:t>Add Synonyms to Azure Search index to ensure relevant results </a:t>
+              <a:t>Create a custom skill to find the top ten most frequent words </a:t>
             </a:r>
           </a:p>
           <a:p>
@@ -2602,23 +2763,7 @@
                 <a:effectLst/>
                 <a:latin typeface="Calibri" panose="020F0502020204030204" pitchFamily="34" charset="0"/>
               </a:rPr>
-              <a:t>Implement query suggestions / autocomplete </a:t>
-            </a:r>
-          </a:p>
-          <a:p>
-            <a:pPr algn="l" rtl="0" fontAlgn="base">
-              <a:buFont typeface="Arial" panose="020B0604020202020204" pitchFamily="34" charset="0"/>
-              <a:buChar char="•"/>
-            </a:pPr>
-            <a:r>
-              <a:rPr lang="en-US" sz="1800" b="0" i="0" dirty="0">
-                <a:solidFill>
-                  <a:srgbClr val="000000"/>
-                </a:solidFill>
-                <a:effectLst/>
-                <a:latin typeface="Calibri" panose="020F0502020204030204" pitchFamily="34" charset="0"/>
-              </a:rPr>
-              <a:t>Add scoring profiles that boost documents in results </a:t>
+              <a:t>Incorporate your custom skill into your web content index </a:t>
             </a:r>
           </a:p>
           <a:p>
@@ -13430,7 +13575,7 @@
           <a:p>
             <a:fld id="{E99080E2-161E-4461-9006-6F8BF1776BE3}" type="datetime1">
               <a:rPr lang="en-US" smtClean="0"/>
-              <a:t>6/27/2023</a:t>
+              <a:t>6/28/2023</a:t>
             </a:fld>
             <a:endParaRPr lang="en-US"/>
           </a:p>
@@ -13543,7 +13688,7 @@
           <a:p>
             <a:fld id="{643E9E83-8A79-40C0-9FE5-E30ED9EDC2DE}" type="datetime1">
               <a:rPr lang="en-US" smtClean="0"/>
-              <a:t>6/27/2023</a:t>
+              <a:t>6/28/2023</a:t>
             </a:fld>
             <a:endParaRPr lang="en-US"/>
           </a:p>
@@ -17439,10 +17584,10 @@
       </p:grpSpPr>
       <p:sp>
         <p:nvSpPr>
-          <p:cNvPr id="2" name="Title 1">
+          <p:cNvPr id="9" name="Title 8">
             <a:extLst>
               <a:ext uri="{FF2B5EF4-FFF2-40B4-BE49-F238E27FC236}">
-                <a16:creationId xmlns:a16="http://schemas.microsoft.com/office/drawing/2014/main" id="{69D2623F-0629-4017-9AFA-1E52CD042452}"/>
+                <a16:creationId xmlns:a16="http://schemas.microsoft.com/office/drawing/2014/main" id="{A4EA16FA-8D26-451C-9337-113E6EAE3CB9}"/>
               </a:ext>
             </a:extLst>
           </p:cNvPr>
@@ -17453,138 +17598,82 @@
             <p:ph type="title"/>
           </p:nvPr>
         </p:nvSpPr>
-        <p:spPr>
-          <a:xfrm>
-            <a:off x="584200" y="209440"/>
-            <a:ext cx="7440582" cy="495520"/>
-          </a:xfrm>
-        </p:spPr>
+        <p:spPr/>
         <p:txBody>
           <a:bodyPr/>
           <a:lstStyle/>
           <a:p>
             <a:r>
-              <a:rPr lang="en-US" dirty="0"/>
-              <a:t>Challenge 1: The Landing Before the Launch</a:t>
-            </a:r>
+              <a:rPr lang="en-US" dirty="0">
+                <a:solidFill>
+                  <a:srgbClr val="FFFFFF"/>
+                </a:solidFill>
+                <a:cs typeface="Segoe UI" panose="020B0502040204020203" pitchFamily="34" charset="0"/>
+              </a:rPr>
+              <a:t>Bring Your Own Data to ChatGPT</a:t>
+            </a:r>
+            <a:endParaRPr lang="en-US" dirty="0"/>
           </a:p>
         </p:txBody>
       </p:sp>
       <p:sp>
         <p:nvSpPr>
-          <p:cNvPr id="4" name="TextBox 3">
+          <p:cNvPr id="10" name="Subtitle 9">
             <a:extLst>
               <a:ext uri="{FF2B5EF4-FFF2-40B4-BE49-F238E27FC236}">
-                <a16:creationId xmlns:a16="http://schemas.microsoft.com/office/drawing/2014/main" id="{3C2941BE-103D-4165-93CB-85210974470C}"/>
+                <a16:creationId xmlns:a16="http://schemas.microsoft.com/office/drawing/2014/main" id="{44CCF6FC-DF3C-472E-916C-66140B389074}"/>
               </a:ext>
             </a:extLst>
           </p:cNvPr>
-          <p:cNvSpPr txBox="1"/>
-          <p:nvPr/>
+          <p:cNvSpPr>
+            <a:spLocks noGrp="1"/>
+          </p:cNvSpPr>
+          <p:nvPr>
+            <p:ph type="subTitle" idx="1"/>
+          </p:nvPr>
         </p:nvSpPr>
-        <p:spPr>
-          <a:xfrm>
-            <a:off x="584200" y="1396137"/>
-            <a:ext cx="11036300" cy="2862322"/>
-          </a:xfrm>
-          <a:prstGeom prst="rect">
-            <a:avLst/>
-          </a:prstGeom>
-          <a:noFill/>
-        </p:spPr>
+        <p:spPr/>
         <p:txBody>
-          <a:bodyPr wrap="square" lIns="91440" tIns="45720" rIns="91440" bIns="45720" anchor="t">
-            <a:spAutoFit/>
-          </a:bodyPr>
+          <a:bodyPr/>
           <a:lstStyle/>
           <a:p>
-            <a:pPr algn="l" rtl="0" fontAlgn="base"/>
-            <a:endParaRPr lang="en-US" sz="2000" b="0" i="0" dirty="0">
-              <a:effectLst/>
-            </a:endParaRPr>
-          </a:p>
-          <a:p>
-            <a:pPr algn="l" rtl="0" fontAlgn="base"/>
-            <a:r>
-              <a:rPr lang="en-US" sz="2000" b="0" i="0" dirty="0">
-                <a:effectLst/>
+            <a:r>
+              <a:rPr lang="en-US"/>
+              <a:t>Challenge walkthrough for </a:t>
+            </a:r>
+            <a:r>
+              <a:rPr lang="en-US" b="1">
+                <a:solidFill>
+                  <a:schemeClr val="accent1"/>
+                </a:solidFill>
               </a:rPr>
-              <a:t>For this challenge, you will deploy the services into the landing zone in preparation for the launch of the POC.</a:t>
-            </a:r>
-          </a:p>
-          <a:p>
-            <a:pPr algn="l" rtl="0" fontAlgn="base"/>
-            <a:endParaRPr lang="en-US" sz="2000" b="0" i="0" dirty="0">
-              <a:effectLst/>
-            </a:endParaRPr>
-          </a:p>
-          <a:p>
-            <a:pPr algn="l" rtl="0" fontAlgn="base"/>
-            <a:r>
-              <a:rPr lang="en-US" sz="2000" b="1" i="0" dirty="0">
-                <a:effectLst/>
-              </a:rPr>
-              <a:t>Learning objectives: </a:t>
-            </a:r>
-          </a:p>
-          <a:p>
-            <a:pPr algn="l" rtl="0" fontAlgn="base"/>
-            <a:endParaRPr lang="en-US" sz="2000" b="0" i="0" dirty="0">
-              <a:effectLst/>
-            </a:endParaRPr>
-          </a:p>
-          <a:p>
-            <a:pPr marL="342900" indent="-342900" algn="l" rtl="0" fontAlgn="base">
-              <a:buFont typeface="Arial" panose="020B0604020202020204" pitchFamily="34" charset="0"/>
-              <a:buChar char="•"/>
-            </a:pPr>
-            <a:r>
-              <a:rPr lang="en-US" sz="2000" b="0" i="0" dirty="0">
-                <a:effectLst/>
-              </a:rPr>
-              <a:t>Deploy the Azure services needed to support the chat interface</a:t>
-            </a:r>
-          </a:p>
-          <a:p>
-            <a:pPr marL="342900" indent="-342900" algn="l" rtl="0" fontAlgn="base">
-              <a:buFont typeface="Arial" panose="020B0604020202020204" pitchFamily="34" charset="0"/>
-              <a:buChar char="•"/>
-            </a:pPr>
-            <a:endParaRPr lang="en-US" sz="2000" b="0" i="0" dirty="0">
-              <a:effectLst/>
-            </a:endParaRPr>
-          </a:p>
-          <a:p>
-            <a:pPr marL="342900" indent="-342900" algn="l" rtl="0" fontAlgn="base">
-              <a:buFont typeface="Arial" panose="020B0604020202020204" pitchFamily="34" charset="0"/>
-              <a:buChar char="•"/>
-            </a:pPr>
-            <a:r>
-              <a:rPr lang="en-US" sz="2000" b="0" i="0" dirty="0">
-                <a:effectLst/>
-              </a:rPr>
-              <a:t>Understand the setup of the development environment</a:t>
-            </a:r>
-            <a:endParaRPr lang="en-US" sz="2000" b="0" i="0" dirty="0">
-              <a:effectLst/>
-              <a:cs typeface="Segoe UI"/>
-            </a:endParaRPr>
+              <a:t>coaches</a:t>
+            </a:r>
           </a:p>
         </p:txBody>
       </p:sp>
     </p:spTree>
     <p:extLst>
       <p:ext uri="{BB962C8B-B14F-4D97-AF65-F5344CB8AC3E}">
-        <p14:creationId xmlns:p14="http://schemas.microsoft.com/office/powerpoint/2010/main" val="3693466064"/>
+        <p14:creationId xmlns:p14="http://schemas.microsoft.com/office/powerpoint/2010/main" val="2648741953"/>
       </p:ext>
     </p:extLst>
   </p:cSld>
   <p:clrMapOvr>
     <a:masterClrMapping/>
   </p:clrMapOvr>
-  <p:transition>
-    <p:fade/>
-  </p:transition>
+  <mc:AlternateContent xmlns:mc="http://schemas.openxmlformats.org/markup-compatibility/2006" xmlns:p14="http://schemas.microsoft.com/office/powerpoint/2010/main">
+    <mc:Choice Requires="p14">
+      <p:transition spd="med" p14:dur="700">
+        <p:fade/>
+      </p:transition>
+    </mc:Choice>
+    <mc:Fallback xmlns="">
+      <p:transition spd="med">
+        <p:fade/>
+      </p:transition>
+    </mc:Fallback>
+  </mc:AlternateContent>
 </p:sld>
 </file>
 
@@ -17624,7 +17713,7 @@
         <p:spPr>
           <a:xfrm>
             <a:off x="584200" y="209440"/>
-            <a:ext cx="7440582" cy="926407"/>
+            <a:ext cx="7440582" cy="495520"/>
           </a:xfrm>
         </p:spPr>
         <p:txBody>
@@ -17633,12 +17722,8 @@
           <a:p>
             <a:r>
               <a:rPr lang="en-US" dirty="0"/>
-              <a:t>Challenge 2: It's All About the Payload</a:t>
-            </a:r>
-            <a:br>
-              <a:rPr lang="en-US" dirty="0"/>
-            </a:br>
-            <a:endParaRPr lang="en-US" dirty="0"/>
+              <a:t>Challenge 1: The Landing Before the Launch</a:t>
+            </a:r>
           </a:p>
         </p:txBody>
       </p:sp>
@@ -17647,7 +17732,7 @@
           <p:cNvPr id="4" name="TextBox 3">
             <a:extLst>
               <a:ext uri="{FF2B5EF4-FFF2-40B4-BE49-F238E27FC236}">
-                <a16:creationId xmlns:a16="http://schemas.microsoft.com/office/drawing/2014/main" id="{1CC078BE-0A60-49C8-8EDA-2EBC51A5DC70}"/>
+                <a16:creationId xmlns:a16="http://schemas.microsoft.com/office/drawing/2014/main" id="{3C2941BE-103D-4165-93CB-85210974470C}"/>
               </a:ext>
             </a:extLst>
           </p:cNvPr>
@@ -17657,7 +17742,7 @@
         <p:spPr>
           <a:xfrm>
             <a:off x="584200" y="1396137"/>
-            <a:ext cx="11036300" cy="3477875"/>
+            <a:ext cx="11036300" cy="2862322"/>
           </a:xfrm>
           <a:prstGeom prst="rect">
             <a:avLst/>
@@ -17665,39 +17750,10 @@
           <a:noFill/>
         </p:spPr>
         <p:txBody>
-          <a:bodyPr wrap="square">
+          <a:bodyPr wrap="square" lIns="91440" tIns="45720" rIns="91440" bIns="45720" anchor="t">
             <a:spAutoFit/>
           </a:bodyPr>
           <a:lstStyle/>
-          <a:p>
-            <a:pPr algn="l" rtl="0" fontAlgn="base"/>
-            <a:r>
-              <a:rPr lang="en-US" sz="2000" b="0" i="0" dirty="0">
-                <a:effectLst/>
-              </a:rPr>
-              <a:t>In this challenge</a:t>
-            </a:r>
-            <a:r>
-              <a:rPr lang="en-US" sz="2000" dirty="0"/>
-              <a:t> participants</a:t>
-            </a:r>
-            <a:r>
-              <a:rPr lang="en-US" sz="2000" b="0" i="0" dirty="0">
-                <a:effectLst/>
-              </a:rPr>
-              <a:t> will </a:t>
-            </a:r>
-            <a:r>
-              <a:rPr lang="en-US" sz="2000" dirty="0"/>
-              <a:t>learn to create vector embeddings using Azure OpenAI</a:t>
-            </a:r>
-            <a:r>
-              <a:rPr lang="en-US" sz="2000" b="0" i="0" dirty="0">
-                <a:effectLst/>
-              </a:rPr>
-              <a:t> from data stored in Cosmos DB. </a:t>
-            </a:r>
-          </a:p>
           <a:p>
             <a:pPr algn="l" rtl="0" fontAlgn="base"/>
             <a:endParaRPr lang="en-US" sz="2000" b="0" i="0" dirty="0">
@@ -17707,6 +17763,21 @@
           <a:p>
             <a:pPr algn="l" rtl="0" fontAlgn="base"/>
             <a:r>
+              <a:rPr lang="en-US" sz="2000" b="0" i="0" dirty="0">
+                <a:effectLst/>
+              </a:rPr>
+              <a:t>For this challenge, you will deploy the services into the landing zone in preparation for the launch of the POC.</a:t>
+            </a:r>
+          </a:p>
+          <a:p>
+            <a:pPr algn="l" rtl="0" fontAlgn="base"/>
+            <a:endParaRPr lang="en-US" sz="2000" b="0" i="0" dirty="0">
+              <a:effectLst/>
+            </a:endParaRPr>
+          </a:p>
+          <a:p>
+            <a:pPr algn="l" rtl="0" fontAlgn="base"/>
+            <a:r>
               <a:rPr lang="en-US" sz="2000" b="1" i="0" dirty="0">
                 <a:effectLst/>
               </a:rPr>
@@ -17728,30 +17799,17 @@
               <a:rPr lang="en-US" sz="2000" b="0" i="0" dirty="0">
                 <a:effectLst/>
               </a:rPr>
-              <a:t>Load data from storage into Cosmos DB</a:t>
-            </a:r>
-            <a:br>
-              <a:rPr lang="en-US" sz="2000" b="0" i="0" dirty="0">
-                <a:effectLst/>
-              </a:rPr>
-            </a:br>
-            <a:endParaRPr lang="en-US" sz="2000" b="0" i="0" dirty="0">
-              <a:effectLst/>
-            </a:endParaRPr>
+              <a:t>Deploy the Azure services needed to support the chat interface</a:t>
+            </a:r>
           </a:p>
           <a:p>
             <a:pPr marL="342900" indent="-342900" algn="l" rtl="0" fontAlgn="base">
               <a:buFont typeface="Arial" panose="020B0604020202020204" pitchFamily="34" charset="0"/>
               <a:buChar char="•"/>
             </a:pPr>
-            <a:r>
-              <a:rPr lang="en-US" sz="2000" dirty="0"/>
-              <a:t>Use Azure Open AI to create vector embeddings</a:t>
-            </a:r>
-            <a:br>
-              <a:rPr lang="en-US" sz="2000" dirty="0"/>
-            </a:br>
-            <a:endParaRPr lang="en-US" sz="2000" dirty="0"/>
+            <a:endParaRPr lang="en-US" sz="2000" b="0" i="0" dirty="0">
+              <a:effectLst/>
+            </a:endParaRPr>
           </a:p>
           <a:p>
             <a:pPr marL="342900" indent="-342900" algn="l" rtl="0" fontAlgn="base">
@@ -17759,11 +17817,14 @@
               <a:buChar char="•"/>
             </a:pPr>
             <a:r>
-              <a:rPr lang="en-US" sz="2000" dirty="0"/>
-              <a:t>Store the vector embeddings for later use in a vector database provided by Azure Cognitive Search</a:t>
+              <a:rPr lang="en-US" sz="2000" b="0" i="0" dirty="0">
+                <a:effectLst/>
+              </a:rPr>
+              <a:t>Understand the setup of the development environment</a:t>
             </a:r>
             <a:endParaRPr lang="en-US" sz="2000" b="0" i="0" dirty="0">
               <a:effectLst/>
+              <a:cs typeface="Segoe UI"/>
             </a:endParaRPr>
           </a:p>
         </p:txBody>
@@ -17771,7 +17832,7 @@
     </p:spTree>
     <p:extLst>
       <p:ext uri="{BB962C8B-B14F-4D97-AF65-F5344CB8AC3E}">
-        <p14:creationId xmlns:p14="http://schemas.microsoft.com/office/powerpoint/2010/main" val="3229930525"/>
+        <p14:creationId xmlns:p14="http://schemas.microsoft.com/office/powerpoint/2010/main" val="3693466064"/>
       </p:ext>
     </p:extLst>
   </p:cSld>
@@ -17820,7 +17881,7 @@
         <p:spPr>
           <a:xfrm>
             <a:off x="584200" y="209440"/>
-            <a:ext cx="7440582" cy="495520"/>
+            <a:ext cx="7440582" cy="926407"/>
           </a:xfrm>
         </p:spPr>
         <p:txBody>
@@ -17829,8 +17890,12 @@
           <a:p>
             <a:r>
               <a:rPr lang="en-US" dirty="0"/>
-              <a:t>Challenge 3: Now We're Flying</a:t>
-            </a:r>
+              <a:t>Challenge 2: It's All About the Payload</a:t>
+            </a:r>
+            <a:br>
+              <a:rPr lang="en-US" dirty="0"/>
+            </a:br>
+            <a:endParaRPr lang="en-US" dirty="0"/>
           </a:p>
         </p:txBody>
       </p:sp>
@@ -17839,7 +17904,7 @@
           <p:cNvPr id="4" name="TextBox 3">
             <a:extLst>
               <a:ext uri="{FF2B5EF4-FFF2-40B4-BE49-F238E27FC236}">
-                <a16:creationId xmlns:a16="http://schemas.microsoft.com/office/drawing/2014/main" id="{C66AB271-DFBE-48F7-9D8A-116CBE3C573C}"/>
+                <a16:creationId xmlns:a16="http://schemas.microsoft.com/office/drawing/2014/main" id="{1CC078BE-0A60-49C8-8EDA-2EBC51A5DC70}"/>
               </a:ext>
             </a:extLst>
           </p:cNvPr>
@@ -17849,7 +17914,7 @@
         <p:spPr>
           <a:xfrm>
             <a:off x="584200" y="1396137"/>
-            <a:ext cx="11036300" cy="3170099"/>
+            <a:ext cx="11036300" cy="3477875"/>
           </a:xfrm>
           <a:prstGeom prst="rect">
             <a:avLst/>
@@ -17881,11 +17946,14 @@
             </a:r>
             <a:r>
               <a:rPr lang="en-US" sz="2000" dirty="0"/>
-              <a:t>create the workflow that ties everything together and displays it in chat form, from acquiring a vector embedding for the user’s question to producing the completion that contains the response from the large language model. </a:t>
-            </a:r>
-            <a:endParaRPr lang="en-US" sz="2000" b="0" i="0" dirty="0">
-              <a:effectLst/>
-            </a:endParaRPr>
+              <a:t>learn to create vector embeddings using Azure OpenAI</a:t>
+            </a:r>
+            <a:r>
+              <a:rPr lang="en-US" sz="2000" b="0" i="0" dirty="0">
+                <a:effectLst/>
+              </a:rPr>
+              <a:t> from data stored in Cosmos DB. </a:t>
+            </a:r>
           </a:p>
           <a:p>
             <a:pPr algn="l" rtl="0" fontAlgn="base"/>
@@ -17917,8 +17985,16 @@
               <a:rPr lang="en-US" sz="2000" b="0" i="0" dirty="0">
                 <a:effectLst/>
               </a:rPr>
-              <a:t>Update the chat interface to initiate the workflow</a:t>
-            </a:r>
+              <a:t>Load data from storage into Cosmos DB</a:t>
+            </a:r>
+            <a:br>
+              <a:rPr lang="en-US" sz="2000" b="0" i="0" dirty="0">
+                <a:effectLst/>
+              </a:rPr>
+            </a:br>
+            <a:endParaRPr lang="en-US" sz="2000" b="0" i="0" dirty="0">
+              <a:effectLst/>
+            </a:endParaRPr>
           </a:p>
           <a:p>
             <a:pPr marL="342900" indent="-342900" algn="l" rtl="0" fontAlgn="base">
@@ -17927,8 +18003,12 @@
             </a:pPr>
             <a:r>
               <a:rPr lang="en-US" sz="2000" dirty="0"/>
-              <a:t>Invoke the Azure OpenAI completion endpoint</a:t>
-            </a:r>
+              <a:t>Use Azure Open AI to create vector embeddings</a:t>
+            </a:r>
+            <a:br>
+              <a:rPr lang="en-US" sz="2000" dirty="0"/>
+            </a:br>
+            <a:endParaRPr lang="en-US" sz="2000" dirty="0"/>
           </a:p>
           <a:p>
             <a:pPr marL="342900" indent="-342900" algn="l" rtl="0" fontAlgn="base">
@@ -17937,25 +18017,7 @@
             </a:pPr>
             <a:r>
               <a:rPr lang="en-US" sz="2000" dirty="0"/>
-              <a:t>Perform prompt engineering to create the system prompt</a:t>
-            </a:r>
-          </a:p>
-          <a:p>
-            <a:pPr marL="342900" indent="-342900" algn="l" rtl="0" fontAlgn="base">
-              <a:buFont typeface="Arial" panose="020B0604020202020204" pitchFamily="34" charset="0"/>
-              <a:buChar char="•"/>
-            </a:pPr>
-            <a:r>
-              <a:rPr lang="en-US" sz="2000" b="0" i="0" dirty="0">
-                <a:effectLst/>
-              </a:rPr>
-              <a:t>Store the user’s questions and generated </a:t>
-            </a:r>
-            <a:r>
-              <a:rPr lang="en-US" sz="2000" b="0" i="0" dirty="0" err="1">
-                <a:effectLst/>
-              </a:rPr>
-              <a:t>respones</a:t>
+              <a:t>Store the vector embeddings for later use in a vector database provided by Azure Cognitive Search</a:t>
             </a:r>
             <a:endParaRPr lang="en-US" sz="2000" b="0" i="0" dirty="0">
               <a:effectLst/>
@@ -17966,7 +18028,7 @@
     </p:spTree>
     <p:extLst>
       <p:ext uri="{BB962C8B-B14F-4D97-AF65-F5344CB8AC3E}">
-        <p14:creationId xmlns:p14="http://schemas.microsoft.com/office/powerpoint/2010/main" val="3214549841"/>
+        <p14:creationId xmlns:p14="http://schemas.microsoft.com/office/powerpoint/2010/main" val="3229930525"/>
       </p:ext>
     </p:extLst>
   </p:cSld>
@@ -18024,7 +18086,7 @@
           <a:p>
             <a:r>
               <a:rPr lang="en-US" dirty="0"/>
-              <a:t>Challenge 4: Getting the Full Picture </a:t>
+              <a:t>Challenge 3: Now We're Flying</a:t>
             </a:r>
           </a:p>
         </p:txBody>
@@ -18034,7 +18096,7 @@
           <p:cNvPr id="4" name="TextBox 3">
             <a:extLst>
               <a:ext uri="{FF2B5EF4-FFF2-40B4-BE49-F238E27FC236}">
-                <a16:creationId xmlns:a16="http://schemas.microsoft.com/office/drawing/2014/main" id="{CD037916-DF96-4B73-B2C1-764F918DCF34}"/>
+                <a16:creationId xmlns:a16="http://schemas.microsoft.com/office/drawing/2014/main" id="{C66AB271-DFBE-48F7-9D8A-116CBE3C573C}"/>
               </a:ext>
             </a:extLst>
           </p:cNvPr>
@@ -18044,7 +18106,7 @@
         <p:spPr>
           <a:xfrm>
             <a:off x="584200" y="1396137"/>
-            <a:ext cx="11036300" cy="2554545"/>
+            <a:ext cx="11036300" cy="3170099"/>
           </a:xfrm>
           <a:prstGeom prst="rect">
             <a:avLst/>
@@ -18072,13 +18134,18 @@
               <a:rPr lang="en-US" sz="2000" b="0" i="0" dirty="0">
                 <a:effectLst/>
               </a:rPr>
-              <a:t> will load new data using the data loading mechanism created in a previously, observe the automatic vectorization ask a question through the prompt interface to returns an answer about the new data loaded.</a:t>
-            </a:r>
-            <a:br>
-              <a:rPr lang="en-US" sz="2000" b="0" i="0" dirty="0">
-                <a:effectLst/>
-              </a:rPr>
-            </a:br>
+              <a:t> will </a:t>
+            </a:r>
+            <a:r>
+              <a:rPr lang="en-US" sz="2000" dirty="0"/>
+              <a:t>create the workflow that ties everything together and displays it in chat form, from acquiring a vector embedding for the user’s question to producing the completion that contains the response from the large language model. </a:t>
+            </a:r>
+            <a:endParaRPr lang="en-US" sz="2000" b="0" i="0" dirty="0">
+              <a:effectLst/>
+            </a:endParaRPr>
+          </a:p>
+          <a:p>
+            <a:pPr algn="l" rtl="0" fontAlgn="base"/>
             <a:endParaRPr lang="en-US" sz="2000" b="0" i="0" dirty="0">
               <a:effectLst/>
             </a:endParaRPr>
@@ -18107,7 +18174,7 @@
               <a:rPr lang="en-US" sz="2000" b="0" i="0" dirty="0">
                 <a:effectLst/>
               </a:rPr>
-              <a:t>Load new data using the data loading mechanism</a:t>
+              <a:t>Update the chat interface to initiate the workflow</a:t>
             </a:r>
           </a:p>
           <a:p>
@@ -18116,18 +18183,47 @@
               <a:buChar char="•"/>
             </a:pPr>
             <a:r>
+              <a:rPr lang="en-US" sz="2000" dirty="0"/>
+              <a:t>Invoke the Azure OpenAI completion endpoint</a:t>
+            </a:r>
+          </a:p>
+          <a:p>
+            <a:pPr marL="342900" indent="-342900" algn="l" rtl="0" fontAlgn="base">
+              <a:buFont typeface="Arial" panose="020B0604020202020204" pitchFamily="34" charset="0"/>
+              <a:buChar char="•"/>
+            </a:pPr>
+            <a:r>
+              <a:rPr lang="en-US" sz="2000" dirty="0"/>
+              <a:t>Perform prompt engineering to create the system prompt</a:t>
+            </a:r>
+          </a:p>
+          <a:p>
+            <a:pPr marL="342900" indent="-342900" algn="l" rtl="0" fontAlgn="base">
+              <a:buFont typeface="Arial" panose="020B0604020202020204" pitchFamily="34" charset="0"/>
+              <a:buChar char="•"/>
+            </a:pPr>
+            <a:r>
               <a:rPr lang="en-US" sz="2000" b="0" i="0" dirty="0">
                 <a:effectLst/>
               </a:rPr>
-              <a:t>Experiment with various prompting strategies to answer questions about the new data </a:t>
-            </a:r>
+              <a:t>Store the user’s questions and generated </a:t>
+            </a:r>
+            <a:r>
+              <a:rPr lang="en-US" sz="2000" b="0" i="0" dirty="0" err="1">
+                <a:effectLst/>
+              </a:rPr>
+              <a:t>respones</a:t>
+            </a:r>
+            <a:endParaRPr lang="en-US" sz="2000" b="0" i="0" dirty="0">
+              <a:effectLst/>
+            </a:endParaRPr>
           </a:p>
         </p:txBody>
       </p:sp>
     </p:spTree>
     <p:extLst>
       <p:ext uri="{BB962C8B-B14F-4D97-AF65-F5344CB8AC3E}">
-        <p14:creationId xmlns:p14="http://schemas.microsoft.com/office/powerpoint/2010/main" val="2643562220"/>
+        <p14:creationId xmlns:p14="http://schemas.microsoft.com/office/powerpoint/2010/main" val="3214549841"/>
       </p:ext>
     </p:extLst>
   </p:cSld>
@@ -18176,7 +18272,7 @@
         <p:spPr>
           <a:xfrm>
             <a:off x="584200" y="209440"/>
-            <a:ext cx="8763000" cy="926407"/>
+            <a:ext cx="7440582" cy="495520"/>
           </a:xfrm>
         </p:spPr>
         <p:txBody>
@@ -18185,7 +18281,7 @@
           <a:p>
             <a:r>
               <a:rPr lang="en-US" dirty="0"/>
-              <a:t>Challenge 5: It's All About the Payload, The Sequel</a:t>
+              <a:t>Challenge 4: Getting the Full Picture </a:t>
             </a:r>
           </a:p>
         </p:txBody>
@@ -18195,7 +18291,7 @@
           <p:cNvPr id="4" name="TextBox 3">
             <a:extLst>
               <a:ext uri="{FF2B5EF4-FFF2-40B4-BE49-F238E27FC236}">
-                <a16:creationId xmlns:a16="http://schemas.microsoft.com/office/drawing/2014/main" id="{3B0099AB-0385-4248-B70E-F201157859DD}"/>
+                <a16:creationId xmlns:a16="http://schemas.microsoft.com/office/drawing/2014/main" id="{CD037916-DF96-4B73-B2C1-764F918DCF34}"/>
               </a:ext>
             </a:extLst>
           </p:cNvPr>
@@ -18233,7 +18329,24 @@
               <a:rPr lang="en-US" sz="2000" b="0" i="0" dirty="0">
                 <a:effectLst/>
               </a:rPr>
-              <a:t> will test their workflow loading a new type of data previously unseen by the language model.</a:t>
+              <a:t> will load new data using the data loading mechanism created in a previously, observe the automatic vectorization ask a question through the prompt interface to returns an answer about the new data loaded.</a:t>
+            </a:r>
+            <a:br>
+              <a:rPr lang="en-US" sz="2000" b="0" i="0" dirty="0">
+                <a:effectLst/>
+              </a:rPr>
+            </a:br>
+            <a:endParaRPr lang="en-US" sz="2000" b="0" i="0" dirty="0">
+              <a:effectLst/>
+            </a:endParaRPr>
+          </a:p>
+          <a:p>
+            <a:pPr algn="l" rtl="0" fontAlgn="base"/>
+            <a:r>
+              <a:rPr lang="en-US" sz="2000" b="1" i="0" dirty="0">
+                <a:effectLst/>
+              </a:rPr>
+              <a:t>Learning objectives: </a:t>
             </a:r>
           </a:p>
           <a:p>
@@ -18243,21 +18356,6 @@
             </a:endParaRPr>
           </a:p>
           <a:p>
-            <a:pPr algn="l" rtl="0" fontAlgn="base"/>
-            <a:r>
-              <a:rPr lang="en-US" sz="2000" b="1" i="0" dirty="0">
-                <a:effectLst/>
-              </a:rPr>
-              <a:t>Learning objectives: </a:t>
-            </a:r>
-          </a:p>
-          <a:p>
-            <a:pPr algn="l" rtl="0" fontAlgn="base"/>
-            <a:endParaRPr lang="en-US" sz="2000" b="0" i="0" dirty="0">
-              <a:effectLst/>
-            </a:endParaRPr>
-          </a:p>
-          <a:p>
             <a:pPr marL="342900" indent="-342900" algn="l" rtl="0" fontAlgn="base">
               <a:buFont typeface="Arial" panose="020B0604020202020204" pitchFamily="34" charset="0"/>
               <a:buChar char="•"/>
@@ -18266,7 +18364,7 @@
               <a:rPr lang="en-US" sz="2000" b="0" i="0" dirty="0">
                 <a:effectLst/>
               </a:rPr>
-              <a:t>Create a new index in the vector database for the new data type.</a:t>
+              <a:t>Load new data using the data loading mechanism</a:t>
             </a:r>
           </a:p>
           <a:p>
@@ -18278,19 +18376,7 @@
               <a:rPr lang="en-US" sz="2000" b="0" i="0" dirty="0">
                 <a:effectLst/>
               </a:rPr>
-              <a:t>Load the new data type into Cosmos DB.</a:t>
-            </a:r>
-          </a:p>
-          <a:p>
-            <a:pPr marL="342900" indent="-342900" algn="l" rtl="0" fontAlgn="base">
-              <a:buFont typeface="Arial" panose="020B0604020202020204" pitchFamily="34" charset="0"/>
-              <a:buChar char="•"/>
-            </a:pPr>
-            <a:r>
-              <a:rPr lang="en-US" sz="2000" b="0" i="0" dirty="0">
-                <a:effectLst/>
-              </a:rPr>
-              <a:t>Use the chat interface to ask questions about the new data type.</a:t>
+              <a:t>Experiment with various prompting strategies to answer questions about the new data </a:t>
             </a:r>
           </a:p>
         </p:txBody>
@@ -18298,7 +18384,7 @@
     </p:spTree>
     <p:extLst>
       <p:ext uri="{BB962C8B-B14F-4D97-AF65-F5344CB8AC3E}">
-        <p14:creationId xmlns:p14="http://schemas.microsoft.com/office/powerpoint/2010/main" val="4248767057"/>
+        <p14:creationId xmlns:p14="http://schemas.microsoft.com/office/powerpoint/2010/main" val="2643562220"/>
       </p:ext>
     </p:extLst>
   </p:cSld>
@@ -18347,7 +18433,7 @@
         <p:spPr>
           <a:xfrm>
             <a:off x="584200" y="209440"/>
-            <a:ext cx="7440582" cy="495520"/>
+            <a:ext cx="8763000" cy="926407"/>
           </a:xfrm>
         </p:spPr>
         <p:txBody>
@@ -18356,7 +18442,7 @@
           <a:p>
             <a:r>
               <a:rPr lang="en-US" dirty="0"/>
-              <a:t>Challenge 6: The Punctual Engineer</a:t>
+              <a:t>Challenge 5: It's All About the Payload, The Sequel</a:t>
             </a:r>
           </a:p>
         </p:txBody>
@@ -18366,7 +18452,7 @@
           <p:cNvPr id="4" name="TextBox 3">
             <a:extLst>
               <a:ext uri="{FF2B5EF4-FFF2-40B4-BE49-F238E27FC236}">
-                <a16:creationId xmlns:a16="http://schemas.microsoft.com/office/drawing/2014/main" id="{CA3BDE6C-C3B7-4E22-B4CB-DA16BD5B33FA}"/>
+                <a16:creationId xmlns:a16="http://schemas.microsoft.com/office/drawing/2014/main" id="{3B0099AB-0385-4248-B70E-F201157859DD}"/>
               </a:ext>
             </a:extLst>
           </p:cNvPr>
@@ -18376,7 +18462,7 @@
         <p:spPr>
           <a:xfrm>
             <a:off x="584200" y="1396137"/>
-            <a:ext cx="11036300" cy="3170099"/>
+            <a:ext cx="11036300" cy="2554545"/>
           </a:xfrm>
           <a:prstGeom prst="rect">
             <a:avLst/>
@@ -18404,19 +18490,7 @@
               <a:rPr lang="en-US" sz="2000" b="0" i="0" dirty="0">
                 <a:effectLst/>
               </a:rPr>
-              <a:t> will use a technique called </a:t>
-            </a:r>
-            <a:r>
-              <a:rPr lang="en-US" sz="2000" b="0" i="1" dirty="0">
-                <a:effectLst/>
-              </a:rPr>
-              <a:t>prompt engineering</a:t>
-            </a:r>
-            <a:r>
-              <a:rPr lang="en-US" sz="2000" b="0" i="0" dirty="0">
-                <a:effectLst/>
-              </a:rPr>
-              <a:t> to generate improved prompts that are used to generate completions.  </a:t>
+              <a:t> will test their workflow loading a new type of data previously unseen by the language model.</a:t>
             </a:r>
           </a:p>
           <a:p>
@@ -18449,43 +18523,7 @@
               <a:rPr lang="en-US" sz="2000" b="0" i="0" dirty="0">
                 <a:effectLst/>
               </a:rPr>
-              <a:t>Create different response formats from the completions model:</a:t>
-            </a:r>
-          </a:p>
-          <a:p>
-            <a:pPr marL="800100" lvl="1" indent="-342900" fontAlgn="base">
-              <a:buFont typeface="Arial" panose="020B0604020202020204" pitchFamily="34" charset="0"/>
-              <a:buChar char="•"/>
-            </a:pPr>
-            <a:r>
-              <a:rPr lang="en-US" sz="2000" b="0" i="0" dirty="0">
-                <a:effectLst/>
-              </a:rPr>
-              <a:t>Respond with a single number</a:t>
-            </a:r>
-          </a:p>
-          <a:p>
-            <a:pPr marL="800100" lvl="1" indent="-342900" fontAlgn="base">
-              <a:buFont typeface="Arial" panose="020B0604020202020204" pitchFamily="34" charset="0"/>
-              <a:buChar char="•"/>
-            </a:pPr>
-            <a:r>
-              <a:rPr lang="en-US" sz="2000" b="0" i="0" dirty="0">
-                <a:effectLst/>
-              </a:rPr>
-              <a:t>Respond with a bulleted list of products</a:t>
-            </a:r>
-          </a:p>
-          <a:p>
-            <a:pPr marL="800100" lvl="1" indent="-342900" fontAlgn="base">
-              <a:buFont typeface="Arial" panose="020B0604020202020204" pitchFamily="34" charset="0"/>
-              <a:buChar char="•"/>
-            </a:pPr>
-            <a:r>
-              <a:rPr lang="en-US" sz="2000" b="0" i="0" dirty="0">
-                <a:effectLst/>
-              </a:rPr>
-              <a:t>Respond with JSON-formatted data</a:t>
+              <a:t>Create a new index in the vector database for the new data type.</a:t>
             </a:r>
           </a:p>
           <a:p>
@@ -18497,7 +18535,19 @@
               <a:rPr lang="en-US" sz="2000" b="0" i="0" dirty="0">
                 <a:effectLst/>
               </a:rPr>
-              <a:t>Have the agent reject off topic questions</a:t>
+              <a:t>Load the new data type into Cosmos DB.</a:t>
+            </a:r>
+          </a:p>
+          <a:p>
+            <a:pPr marL="342900" indent="-342900" algn="l" rtl="0" fontAlgn="base">
+              <a:buFont typeface="Arial" panose="020B0604020202020204" pitchFamily="34" charset="0"/>
+              <a:buChar char="•"/>
+            </a:pPr>
+            <a:r>
+              <a:rPr lang="en-US" sz="2000" b="0" i="0" dirty="0">
+                <a:effectLst/>
+              </a:rPr>
+              <a:t>Use the chat interface to ask questions about the new data type.</a:t>
             </a:r>
           </a:p>
         </p:txBody>
@@ -18505,7 +18555,7 @@
     </p:spTree>
     <p:extLst>
       <p:ext uri="{BB962C8B-B14F-4D97-AF65-F5344CB8AC3E}">
-        <p14:creationId xmlns:p14="http://schemas.microsoft.com/office/powerpoint/2010/main" val="325437525"/>
+        <p14:creationId xmlns:p14="http://schemas.microsoft.com/office/powerpoint/2010/main" val="4248767057"/>
       </p:ext>
     </p:extLst>
   </p:cSld>
@@ -18563,7 +18613,7 @@
           <a:p>
             <a:r>
               <a:rPr lang="en-US" dirty="0"/>
-              <a:t>Challenge 7: The Colonel Needs a Promotion</a:t>
+              <a:t>Challenge 6: The Punctual Engineer</a:t>
             </a:r>
           </a:p>
         </p:txBody>
@@ -18573,7 +18623,7 @@
           <p:cNvPr id="4" name="TextBox 3">
             <a:extLst>
               <a:ext uri="{FF2B5EF4-FFF2-40B4-BE49-F238E27FC236}">
-                <a16:creationId xmlns:a16="http://schemas.microsoft.com/office/drawing/2014/main" id="{7A9531C0-12EB-439C-A2D9-ECEDA0A4E510}"/>
+                <a16:creationId xmlns:a16="http://schemas.microsoft.com/office/drawing/2014/main" id="{CA3BDE6C-C3B7-4E22-B4CB-DA16BD5B33FA}"/>
               </a:ext>
             </a:extLst>
           </p:cNvPr>
@@ -18583,7 +18633,7 @@
         <p:spPr>
           <a:xfrm>
             <a:off x="584200" y="1396137"/>
-            <a:ext cx="11036300" cy="1938992"/>
+            <a:ext cx="11036300" cy="3170099"/>
           </a:xfrm>
           <a:prstGeom prst="rect">
             <a:avLst/>
@@ -18611,7 +18661,19 @@
               <a:rPr lang="en-US" sz="2000" b="0" i="0" dirty="0">
                 <a:effectLst/>
               </a:rPr>
-              <a:t> will augment the solution by creating a new plugin for Semantic Kernel that is used in the completions process</a:t>
+              <a:t> will use a technique called </a:t>
+            </a:r>
+            <a:r>
+              <a:rPr lang="en-US" sz="2000" b="0" i="1" dirty="0">
+                <a:effectLst/>
+              </a:rPr>
+              <a:t>prompt engineering</a:t>
+            </a:r>
+            <a:r>
+              <a:rPr lang="en-US" sz="2000" b="0" i="0" dirty="0">
+                <a:effectLst/>
+              </a:rPr>
+              <a:t> to generate improved prompts that are used to generate completions.  </a:t>
             </a:r>
           </a:p>
           <a:p>
@@ -18644,7 +18706,55 @@
               <a:rPr lang="en-US" sz="2000" b="0" i="0" dirty="0">
                 <a:effectLst/>
               </a:rPr>
-              <a:t>Implement a plugin for Semantic Kernel</a:t>
+              <a:t>Create different response formats from the completions model:</a:t>
+            </a:r>
+          </a:p>
+          <a:p>
+            <a:pPr marL="800100" lvl="1" indent="-342900" fontAlgn="base">
+              <a:buFont typeface="Arial" panose="020B0604020202020204" pitchFamily="34" charset="0"/>
+              <a:buChar char="•"/>
+            </a:pPr>
+            <a:r>
+              <a:rPr lang="en-US" sz="2000" b="0" i="0" dirty="0">
+                <a:effectLst/>
+              </a:rPr>
+              <a:t>Respond with a single number</a:t>
+            </a:r>
+          </a:p>
+          <a:p>
+            <a:pPr marL="800100" lvl="1" indent="-342900" fontAlgn="base">
+              <a:buFont typeface="Arial" panose="020B0604020202020204" pitchFamily="34" charset="0"/>
+              <a:buChar char="•"/>
+            </a:pPr>
+            <a:r>
+              <a:rPr lang="en-US" sz="2000" b="0" i="0" dirty="0">
+                <a:effectLst/>
+              </a:rPr>
+              <a:t>Respond with a bulleted list of products</a:t>
+            </a:r>
+          </a:p>
+          <a:p>
+            <a:pPr marL="800100" lvl="1" indent="-342900" fontAlgn="base">
+              <a:buFont typeface="Arial" panose="020B0604020202020204" pitchFamily="34" charset="0"/>
+              <a:buChar char="•"/>
+            </a:pPr>
+            <a:r>
+              <a:rPr lang="en-US" sz="2000" b="0" i="0" dirty="0">
+                <a:effectLst/>
+              </a:rPr>
+              <a:t>Respond with JSON-formatted data</a:t>
+            </a:r>
+          </a:p>
+          <a:p>
+            <a:pPr marL="342900" indent="-342900" algn="l" rtl="0" fontAlgn="base">
+              <a:buFont typeface="Arial" panose="020B0604020202020204" pitchFamily="34" charset="0"/>
+              <a:buChar char="•"/>
+            </a:pPr>
+            <a:r>
+              <a:rPr lang="en-US" sz="2000" b="0" i="0" dirty="0">
+                <a:effectLst/>
+              </a:rPr>
+              <a:t>Have the agent reject off topic questions</a:t>
             </a:r>
           </a:p>
         </p:txBody>
@@ -18652,7 +18762,7 @@
     </p:spTree>
     <p:extLst>
       <p:ext uri="{BB962C8B-B14F-4D97-AF65-F5344CB8AC3E}">
-        <p14:creationId xmlns:p14="http://schemas.microsoft.com/office/powerpoint/2010/main" val="3194965778"/>
+        <p14:creationId xmlns:p14="http://schemas.microsoft.com/office/powerpoint/2010/main" val="325437525"/>
       </p:ext>
     </p:extLst>
   </p:cSld>
@@ -18710,23 +18820,7 @@
           <a:p>
             <a:r>
               <a:rPr lang="en-US" dirty="0"/>
-              <a:t>Challenge 8: </a:t>
-            </a:r>
-            <a:r>
-              <a:rPr lang="en-US" dirty="0" err="1"/>
-              <a:t>Workin</a:t>
-            </a:r>
-            <a:r>
-              <a:rPr lang="en-US" dirty="0"/>
-              <a:t>' on the </a:t>
-            </a:r>
-            <a:r>
-              <a:rPr lang="en-US" dirty="0" err="1"/>
-              <a:t>LangChain</a:t>
-            </a:r>
-            <a:r>
-              <a:rPr lang="en-US" dirty="0"/>
-              <a:t> Gang!</a:t>
+              <a:t>Challenge 7: The Colonel Needs a Promotion</a:t>
             </a:r>
           </a:p>
         </p:txBody>
@@ -18736,7 +18830,7 @@
           <p:cNvPr id="4" name="TextBox 3">
             <a:extLst>
               <a:ext uri="{FF2B5EF4-FFF2-40B4-BE49-F238E27FC236}">
-                <a16:creationId xmlns:a16="http://schemas.microsoft.com/office/drawing/2014/main" id="{59CC8D6A-7B8B-4BC4-916C-701C0095C825}"/>
+                <a16:creationId xmlns:a16="http://schemas.microsoft.com/office/drawing/2014/main" id="{7A9531C0-12EB-439C-A2D9-ECEDA0A4E510}"/>
               </a:ext>
             </a:extLst>
           </p:cNvPr>
@@ -18746,7 +18840,7 @@
         <p:spPr>
           <a:xfrm>
             <a:off x="584200" y="1396137"/>
-            <a:ext cx="11036300" cy="1631216"/>
+            <a:ext cx="11036300" cy="1938992"/>
           </a:xfrm>
           <a:prstGeom prst="rect">
             <a:avLst/>
@@ -18754,7 +18848,7 @@
           <a:noFill/>
         </p:spPr>
         <p:txBody>
-          <a:bodyPr wrap="square" lIns="91440" tIns="45720" rIns="91440" bIns="45720" anchor="t">
+          <a:bodyPr wrap="square">
             <a:spAutoFit/>
           </a:bodyPr>
           <a:lstStyle/>
@@ -18774,19 +18868,7 @@
               <a:rPr lang="en-US" sz="2000" b="0" i="0" dirty="0">
                 <a:effectLst/>
               </a:rPr>
-              <a:t> will substitute Semantic Kernel with </a:t>
-            </a:r>
-            <a:r>
-              <a:rPr lang="en-US" sz="2000" b="0" i="0" dirty="0" err="1">
-                <a:effectLst/>
-              </a:rPr>
-              <a:t>LangChain</a:t>
-            </a:r>
-            <a:r>
-              <a:rPr lang="en-US" sz="2000" b="0" i="0" dirty="0">
-                <a:effectLst/>
-              </a:rPr>
-              <a:t>.</a:t>
+              <a:t> will augment the solution by creating a new plugin for Semantic Kernel that is used in the completions process</a:t>
             </a:r>
           </a:p>
           <a:p>
@@ -18811,7 +18893,7 @@
             </a:endParaRPr>
           </a:p>
           <a:p>
-            <a:pPr marL="342900" indent="-342900" fontAlgn="base">
+            <a:pPr marL="342900" indent="-342900" algn="l" rtl="0" fontAlgn="base">
               <a:buFont typeface="Arial" panose="020B0604020202020204" pitchFamily="34" charset="0"/>
               <a:buChar char="•"/>
             </a:pPr>
@@ -18819,29 +18901,15 @@
               <a:rPr lang="en-US" sz="2000" b="0" i="0" dirty="0">
                 <a:effectLst/>
               </a:rPr>
-              <a:t>Create a custom skill that calls the </a:t>
-            </a:r>
-            <a:r>
-              <a:rPr lang="en-US" sz="2000" dirty="0"/>
-              <a:t>Form Recognizer</a:t>
-            </a:r>
-            <a:r>
-              <a:rPr lang="en-US" sz="2000" b="0" i="0" dirty="0">
-                <a:effectLst/>
-              </a:rPr>
-              <a:t> Service </a:t>
-            </a:r>
-            <a:endParaRPr lang="en-US" sz="2000" b="0" i="0" dirty="0">
-              <a:effectLst/>
-              <a:cs typeface="Segoe UI"/>
-            </a:endParaRPr>
+              <a:t>Implement a plugin for Semantic Kernel</a:t>
+            </a:r>
           </a:p>
         </p:txBody>
       </p:sp>
     </p:spTree>
     <p:extLst>
       <p:ext uri="{BB962C8B-B14F-4D97-AF65-F5344CB8AC3E}">
-        <p14:creationId xmlns:p14="http://schemas.microsoft.com/office/powerpoint/2010/main" val="3810331631"/>
+        <p14:creationId xmlns:p14="http://schemas.microsoft.com/office/powerpoint/2010/main" val="3194965778"/>
       </p:ext>
     </p:extLst>
   </p:cSld>
@@ -18899,6 +18967,195 @@
           <a:p>
             <a:r>
               <a:rPr lang="en-US" dirty="0"/>
+              <a:t>Challenge 8: </a:t>
+            </a:r>
+            <a:r>
+              <a:rPr lang="en-US" dirty="0" err="1"/>
+              <a:t>Workin</a:t>
+            </a:r>
+            <a:r>
+              <a:rPr lang="en-US" dirty="0"/>
+              <a:t>' on the </a:t>
+            </a:r>
+            <a:r>
+              <a:rPr lang="en-US" dirty="0" err="1"/>
+              <a:t>LangChain</a:t>
+            </a:r>
+            <a:r>
+              <a:rPr lang="en-US" dirty="0"/>
+              <a:t> Gang!</a:t>
+            </a:r>
+          </a:p>
+        </p:txBody>
+      </p:sp>
+      <p:sp>
+        <p:nvSpPr>
+          <p:cNvPr id="4" name="TextBox 3">
+            <a:extLst>
+              <a:ext uri="{FF2B5EF4-FFF2-40B4-BE49-F238E27FC236}">
+                <a16:creationId xmlns:a16="http://schemas.microsoft.com/office/drawing/2014/main" id="{59CC8D6A-7B8B-4BC4-916C-701C0095C825}"/>
+              </a:ext>
+            </a:extLst>
+          </p:cNvPr>
+          <p:cNvSpPr txBox="1"/>
+          <p:nvPr/>
+        </p:nvSpPr>
+        <p:spPr>
+          <a:xfrm>
+            <a:off x="584200" y="1396137"/>
+            <a:ext cx="11036300" cy="1631216"/>
+          </a:xfrm>
+          <a:prstGeom prst="rect">
+            <a:avLst/>
+          </a:prstGeom>
+          <a:noFill/>
+        </p:spPr>
+        <p:txBody>
+          <a:bodyPr wrap="square" lIns="91440" tIns="45720" rIns="91440" bIns="45720" anchor="t">
+            <a:spAutoFit/>
+          </a:bodyPr>
+          <a:lstStyle/>
+          <a:p>
+            <a:pPr algn="l" rtl="0" fontAlgn="base"/>
+            <a:r>
+              <a:rPr lang="en-US" sz="2000" b="0" i="0" dirty="0">
+                <a:effectLst/>
+              </a:rPr>
+              <a:t>In this challenge</a:t>
+            </a:r>
+            <a:r>
+              <a:rPr lang="en-US" sz="2000" dirty="0"/>
+              <a:t> participants</a:t>
+            </a:r>
+            <a:r>
+              <a:rPr lang="en-US" sz="2000" b="0" i="0" dirty="0">
+                <a:effectLst/>
+              </a:rPr>
+              <a:t> will substitute Semantic Kernel with </a:t>
+            </a:r>
+            <a:r>
+              <a:rPr lang="en-US" sz="2000" b="0" i="0" dirty="0" err="1">
+                <a:effectLst/>
+              </a:rPr>
+              <a:t>LangChain</a:t>
+            </a:r>
+            <a:r>
+              <a:rPr lang="en-US" sz="2000" b="0" i="0" dirty="0">
+                <a:effectLst/>
+              </a:rPr>
+              <a:t>.</a:t>
+            </a:r>
+          </a:p>
+          <a:p>
+            <a:pPr algn="l" rtl="0" fontAlgn="base"/>
+            <a:endParaRPr lang="en-US" sz="2000" b="0" i="0" dirty="0">
+              <a:effectLst/>
+            </a:endParaRPr>
+          </a:p>
+          <a:p>
+            <a:pPr algn="l" rtl="0" fontAlgn="base"/>
+            <a:r>
+              <a:rPr lang="en-US" sz="2000" b="1" i="0" dirty="0">
+                <a:effectLst/>
+              </a:rPr>
+              <a:t>Learning objectives: </a:t>
+            </a:r>
+          </a:p>
+          <a:p>
+            <a:pPr algn="l" rtl="0" fontAlgn="base"/>
+            <a:endParaRPr lang="en-US" sz="2000" b="0" i="0" dirty="0">
+              <a:effectLst/>
+            </a:endParaRPr>
+          </a:p>
+          <a:p>
+            <a:pPr marL="342900" indent="-342900" fontAlgn="base">
+              <a:buFont typeface="Arial" panose="020B0604020202020204" pitchFamily="34" charset="0"/>
+              <a:buChar char="•"/>
+            </a:pPr>
+            <a:r>
+              <a:rPr lang="en-US" sz="2000" b="0" i="0" dirty="0">
+                <a:effectLst/>
+              </a:rPr>
+              <a:t>Create a custom skill that calls the </a:t>
+            </a:r>
+            <a:r>
+              <a:rPr lang="en-US" sz="2000" dirty="0"/>
+              <a:t>Form Recognizer</a:t>
+            </a:r>
+            <a:r>
+              <a:rPr lang="en-US" sz="2000" b="0" i="0" dirty="0">
+                <a:effectLst/>
+              </a:rPr>
+              <a:t> Service </a:t>
+            </a:r>
+            <a:endParaRPr lang="en-US" sz="2000" b="0" i="0" dirty="0">
+              <a:effectLst/>
+              <a:cs typeface="Segoe UI"/>
+            </a:endParaRPr>
+          </a:p>
+        </p:txBody>
+      </p:sp>
+    </p:spTree>
+    <p:extLst>
+      <p:ext uri="{BB962C8B-B14F-4D97-AF65-F5344CB8AC3E}">
+        <p14:creationId xmlns:p14="http://schemas.microsoft.com/office/powerpoint/2010/main" val="3810331631"/>
+      </p:ext>
+    </p:extLst>
+  </p:cSld>
+  <p:clrMapOvr>
+    <a:masterClrMapping/>
+  </p:clrMapOvr>
+  <p:transition>
+    <p:fade/>
+  </p:transition>
+</p:sld>
+</file>
+
+<file path=ppt/slides/slide19.xml><?xml version="1.0" encoding="utf-8"?>
+<p:sld xmlns:a="http://schemas.openxmlformats.org/drawingml/2006/main" xmlns:r="http://schemas.openxmlformats.org/officeDocument/2006/relationships" xmlns:p="http://schemas.openxmlformats.org/presentationml/2006/main">
+  <p:cSld>
+    <p:spTree>
+      <p:nvGrpSpPr>
+        <p:cNvPr id="1" name=""/>
+        <p:cNvGrpSpPr/>
+        <p:nvPr/>
+      </p:nvGrpSpPr>
+      <p:grpSpPr>
+        <a:xfrm>
+          <a:off x="0" y="0"/>
+          <a:ext cx="0" cy="0"/>
+          <a:chOff x="0" y="0"/>
+          <a:chExt cx="0" cy="0"/>
+        </a:xfrm>
+      </p:grpSpPr>
+      <p:sp>
+        <p:nvSpPr>
+          <p:cNvPr id="2" name="Title 1">
+            <a:extLst>
+              <a:ext uri="{FF2B5EF4-FFF2-40B4-BE49-F238E27FC236}">
+                <a16:creationId xmlns:a16="http://schemas.microsoft.com/office/drawing/2014/main" id="{69D2623F-0629-4017-9AFA-1E52CD042452}"/>
+              </a:ext>
+            </a:extLst>
+          </p:cNvPr>
+          <p:cNvSpPr>
+            <a:spLocks noGrp="1"/>
+          </p:cNvSpPr>
+          <p:nvPr>
+            <p:ph type="title"/>
+          </p:nvPr>
+        </p:nvSpPr>
+        <p:spPr>
+          <a:xfrm>
+            <a:off x="584200" y="209440"/>
+            <a:ext cx="7440582" cy="495520"/>
+          </a:xfrm>
+        </p:spPr>
+        <p:txBody>
+          <a:bodyPr/>
+          <a:lstStyle/>
+          <a:p>
+            <a:r>
+              <a:rPr lang="en-US" dirty="0"/>
               <a:t>Challenge 9: Getting Into the Flow</a:t>
             </a:r>
           </a:p>
@@ -19001,7 +19258,206 @@
 </p:sld>
 </file>
 
-<file path=ppt/slides/slide19.xml><?xml version="1.0" encoding="utf-8"?>
+<file path=ppt/slides/slide2.xml><?xml version="1.0" encoding="utf-8"?>
+<p:sld xmlns:a="http://schemas.openxmlformats.org/drawingml/2006/main" xmlns:r="http://schemas.openxmlformats.org/officeDocument/2006/relationships" xmlns:p="http://schemas.openxmlformats.org/presentationml/2006/main">
+  <p:cSld>
+    <p:spTree>
+      <p:nvGrpSpPr>
+        <p:cNvPr id="1" name=""/>
+        <p:cNvGrpSpPr/>
+        <p:nvPr/>
+      </p:nvGrpSpPr>
+      <p:grpSpPr>
+        <a:xfrm>
+          <a:off x="0" y="0"/>
+          <a:ext cx="0" cy="0"/>
+          <a:chOff x="0" y="0"/>
+          <a:chExt cx="0" cy="0"/>
+        </a:xfrm>
+      </p:grpSpPr>
+      <p:sp>
+        <p:nvSpPr>
+          <p:cNvPr id="2" name="Title 1">
+            <a:extLst>
+              <a:ext uri="{FF2B5EF4-FFF2-40B4-BE49-F238E27FC236}">
+                <a16:creationId xmlns:a16="http://schemas.microsoft.com/office/drawing/2014/main" id="{A19B3745-E6EE-4A30-8C28-A11C12F5C6B6}"/>
+              </a:ext>
+            </a:extLst>
+          </p:cNvPr>
+          <p:cNvSpPr>
+            <a:spLocks noGrp="1"/>
+          </p:cNvSpPr>
+          <p:nvPr>
+            <p:ph type="title"/>
+          </p:nvPr>
+        </p:nvSpPr>
+        <p:spPr/>
+        <p:txBody>
+          <a:bodyPr/>
+          <a:lstStyle/>
+          <a:p>
+            <a:r>
+              <a:rPr lang="en-US" dirty="0">
+                <a:solidFill>
+                  <a:srgbClr val="FFFFFF"/>
+                </a:solidFill>
+                <a:cs typeface="Segoe UI" panose="020B0502040204020203" pitchFamily="34" charset="0"/>
+              </a:rPr>
+              <a:t>Bring Your Own Data to ChatGPT</a:t>
+            </a:r>
+            <a:endParaRPr lang="en-US" dirty="0"/>
+          </a:p>
+        </p:txBody>
+      </p:sp>
+      <p:sp>
+        <p:nvSpPr>
+          <p:cNvPr id="5" name="Subtitle 4">
+            <a:extLst>
+              <a:ext uri="{FF2B5EF4-FFF2-40B4-BE49-F238E27FC236}">
+                <a16:creationId xmlns:a16="http://schemas.microsoft.com/office/drawing/2014/main" id="{0017443C-D526-49C2-9F5B-8E362D26B578}"/>
+              </a:ext>
+            </a:extLst>
+          </p:cNvPr>
+          <p:cNvSpPr>
+            <a:spLocks noGrp="1"/>
+          </p:cNvSpPr>
+          <p:nvPr>
+            <p:ph type="subTitle" idx="1"/>
+          </p:nvPr>
+        </p:nvSpPr>
+        <p:spPr/>
+        <p:txBody>
+          <a:bodyPr/>
+          <a:lstStyle/>
+          <a:p>
+            <a:r>
+              <a:rPr lang="en-US" dirty="0"/>
+              <a:t>Overview </a:t>
+            </a:r>
+          </a:p>
+        </p:txBody>
+      </p:sp>
+      <p:pic>
+        <p:nvPicPr>
+          <p:cNvPr id="3" name="Picture 2" descr="A picture containing ax, tool&#10;&#10;Description generated with very high confidence">
+            <a:extLst>
+              <a:ext uri="{FF2B5EF4-FFF2-40B4-BE49-F238E27FC236}">
+                <a16:creationId xmlns:a16="http://schemas.microsoft.com/office/drawing/2014/main" id="{5512510E-81F2-4630-8876-36B233BF7382}"/>
+              </a:ext>
+            </a:extLst>
+          </p:cNvPr>
+          <p:cNvPicPr>
+            <a:picLocks noChangeAspect="1"/>
+          </p:cNvPicPr>
+          <p:nvPr/>
+        </p:nvPicPr>
+        <p:blipFill>
+          <a:blip r:embed="rId2"/>
+          <a:stretch>
+            <a:fillRect/>
+          </a:stretch>
+        </p:blipFill>
+        <p:spPr>
+          <a:xfrm>
+            <a:off x="791312" y="6265104"/>
+            <a:ext cx="369332" cy="300266"/>
+          </a:xfrm>
+          <a:prstGeom prst="rect">
+            <a:avLst/>
+          </a:prstGeom>
+        </p:spPr>
+      </p:pic>
+      <p:sp>
+        <p:nvSpPr>
+          <p:cNvPr id="8" name="TextBox 7">
+            <a:extLst>
+              <a:ext uri="{FF2B5EF4-FFF2-40B4-BE49-F238E27FC236}">
+                <a16:creationId xmlns:a16="http://schemas.microsoft.com/office/drawing/2014/main" id="{31ED1272-7959-4D26-A34C-C227A79E7CA5}"/>
+              </a:ext>
+            </a:extLst>
+          </p:cNvPr>
+          <p:cNvSpPr txBox="1"/>
+          <p:nvPr/>
+        </p:nvSpPr>
+        <p:spPr>
+          <a:xfrm>
+            <a:off x="1249285" y="6230571"/>
+            <a:ext cx="1715534" cy="369332"/>
+          </a:xfrm>
+          <a:prstGeom prst="rect">
+            <a:avLst/>
+          </a:prstGeom>
+          <a:noFill/>
+        </p:spPr>
+        <p:txBody>
+          <a:bodyPr wrap="none" rtlCol="0">
+            <a:spAutoFit/>
+          </a:bodyPr>
+          <a:lstStyle/>
+          <a:p>
+            <a:pPr marL="0" marR="0" lvl="0" indent="0" algn="l" defTabSz="914400" rtl="0" eaLnBrk="1" fontAlgn="auto" latinLnBrk="0" hangingPunct="1">
+              <a:lnSpc>
+                <a:spcPct val="100000"/>
+              </a:lnSpc>
+              <a:spcBef>
+                <a:spcPts val="0"/>
+              </a:spcBef>
+              <a:spcAft>
+                <a:spcPts val="0"/>
+              </a:spcAft>
+              <a:buClrTx/>
+              <a:buSzTx/>
+              <a:buFontTx/>
+              <a:buNone/>
+              <a:tabLst/>
+              <a:defRPr/>
+            </a:pPr>
+            <a:r>
+              <a:rPr kumimoji="0" lang="en-US" sz="1800" b="0" i="0" u="none" strike="noStrike" kern="1200" cap="none" spc="0" normalizeH="0" baseline="0" noProof="0">
+                <a:ln>
+                  <a:noFill/>
+                </a:ln>
+                <a:solidFill>
+                  <a:prstClr val="white"/>
+                </a:solidFill>
+                <a:effectLst/>
+                <a:uLnTx/>
+                <a:uFillTx/>
+                <a:latin typeface="Segoe UI" panose="020B0502040204020203" pitchFamily="34" charset="0"/>
+                <a:ea typeface="+mn-ea"/>
+                <a:cs typeface="Segoe UI" panose="020B0502040204020203" pitchFamily="34" charset="0"/>
+              </a:rPr>
+              <a:t>#MSOpenHack</a:t>
+            </a:r>
+          </a:p>
+        </p:txBody>
+      </p:sp>
+    </p:spTree>
+    <p:extLst>
+      <p:ext uri="{BB962C8B-B14F-4D97-AF65-F5344CB8AC3E}">
+        <p14:creationId xmlns:p14="http://schemas.microsoft.com/office/powerpoint/2010/main" val="172670671"/>
+      </p:ext>
+    </p:extLst>
+  </p:cSld>
+  <p:clrMapOvr>
+    <a:masterClrMapping/>
+  </p:clrMapOvr>
+  <mc:AlternateContent xmlns:mc="http://schemas.openxmlformats.org/markup-compatibility/2006" xmlns:p14="http://schemas.microsoft.com/office/powerpoint/2010/main">
+    <mc:Choice Requires="p14">
+      <p:transition spd="med" p14:dur="700">
+        <p:fade/>
+      </p:transition>
+    </mc:Choice>
+    <mc:Fallback xmlns="">
+      <p:transition spd="med">
+        <p:fade/>
+      </p:transition>
+    </mc:Fallback>
+  </mc:AlternateContent>
+</p:sld>
+</file>
+
+<file path=ppt/slides/slide20.xml><?xml version="1.0" encoding="utf-8"?>
 <p:sld xmlns:a="http://schemas.openxmlformats.org/drawingml/2006/main" xmlns:r="http://schemas.openxmlformats.org/officeDocument/2006/relationships" xmlns:p="http://schemas.openxmlformats.org/presentationml/2006/main">
   <p:cSld>
     <p:spTree>
@@ -22219,206 +22675,7 @@
 </p:sld>
 </file>
 
-<file path=ppt/slides/slide2.xml><?xml version="1.0" encoding="utf-8"?>
-<p:sld xmlns:a="http://schemas.openxmlformats.org/drawingml/2006/main" xmlns:r="http://schemas.openxmlformats.org/officeDocument/2006/relationships" xmlns:p="http://schemas.openxmlformats.org/presentationml/2006/main">
-  <p:cSld>
-    <p:spTree>
-      <p:nvGrpSpPr>
-        <p:cNvPr id="1" name=""/>
-        <p:cNvGrpSpPr/>
-        <p:nvPr/>
-      </p:nvGrpSpPr>
-      <p:grpSpPr>
-        <a:xfrm>
-          <a:off x="0" y="0"/>
-          <a:ext cx="0" cy="0"/>
-          <a:chOff x="0" y="0"/>
-          <a:chExt cx="0" cy="0"/>
-        </a:xfrm>
-      </p:grpSpPr>
-      <p:sp>
-        <p:nvSpPr>
-          <p:cNvPr id="2" name="Title 1">
-            <a:extLst>
-              <a:ext uri="{FF2B5EF4-FFF2-40B4-BE49-F238E27FC236}">
-                <a16:creationId xmlns:a16="http://schemas.microsoft.com/office/drawing/2014/main" id="{A19B3745-E6EE-4A30-8C28-A11C12F5C6B6}"/>
-              </a:ext>
-            </a:extLst>
-          </p:cNvPr>
-          <p:cNvSpPr>
-            <a:spLocks noGrp="1"/>
-          </p:cNvSpPr>
-          <p:nvPr>
-            <p:ph type="title"/>
-          </p:nvPr>
-        </p:nvSpPr>
-        <p:spPr/>
-        <p:txBody>
-          <a:bodyPr/>
-          <a:lstStyle/>
-          <a:p>
-            <a:r>
-              <a:rPr lang="en-US" dirty="0">
-                <a:solidFill>
-                  <a:srgbClr val="FFFFFF"/>
-                </a:solidFill>
-                <a:cs typeface="Segoe UI" panose="020B0502040204020203" pitchFamily="34" charset="0"/>
-              </a:rPr>
-              <a:t>Bring Your Own Data to ChatGPT</a:t>
-            </a:r>
-            <a:endParaRPr lang="en-US" dirty="0"/>
-          </a:p>
-        </p:txBody>
-      </p:sp>
-      <p:sp>
-        <p:nvSpPr>
-          <p:cNvPr id="5" name="Subtitle 4">
-            <a:extLst>
-              <a:ext uri="{FF2B5EF4-FFF2-40B4-BE49-F238E27FC236}">
-                <a16:creationId xmlns:a16="http://schemas.microsoft.com/office/drawing/2014/main" id="{0017443C-D526-49C2-9F5B-8E362D26B578}"/>
-              </a:ext>
-            </a:extLst>
-          </p:cNvPr>
-          <p:cNvSpPr>
-            <a:spLocks noGrp="1"/>
-          </p:cNvSpPr>
-          <p:nvPr>
-            <p:ph type="subTitle" idx="1"/>
-          </p:nvPr>
-        </p:nvSpPr>
-        <p:spPr/>
-        <p:txBody>
-          <a:bodyPr/>
-          <a:lstStyle/>
-          <a:p>
-            <a:r>
-              <a:rPr lang="en-US" dirty="0"/>
-              <a:t>Overview </a:t>
-            </a:r>
-          </a:p>
-        </p:txBody>
-      </p:sp>
-      <p:pic>
-        <p:nvPicPr>
-          <p:cNvPr id="3" name="Picture 2" descr="A picture containing ax, tool&#10;&#10;Description generated with very high confidence">
-            <a:extLst>
-              <a:ext uri="{FF2B5EF4-FFF2-40B4-BE49-F238E27FC236}">
-                <a16:creationId xmlns:a16="http://schemas.microsoft.com/office/drawing/2014/main" id="{5512510E-81F2-4630-8876-36B233BF7382}"/>
-              </a:ext>
-            </a:extLst>
-          </p:cNvPr>
-          <p:cNvPicPr>
-            <a:picLocks noChangeAspect="1"/>
-          </p:cNvPicPr>
-          <p:nvPr/>
-        </p:nvPicPr>
-        <p:blipFill>
-          <a:blip r:embed="rId2"/>
-          <a:stretch>
-            <a:fillRect/>
-          </a:stretch>
-        </p:blipFill>
-        <p:spPr>
-          <a:xfrm>
-            <a:off x="791312" y="6265104"/>
-            <a:ext cx="369332" cy="300266"/>
-          </a:xfrm>
-          <a:prstGeom prst="rect">
-            <a:avLst/>
-          </a:prstGeom>
-        </p:spPr>
-      </p:pic>
-      <p:sp>
-        <p:nvSpPr>
-          <p:cNvPr id="8" name="TextBox 7">
-            <a:extLst>
-              <a:ext uri="{FF2B5EF4-FFF2-40B4-BE49-F238E27FC236}">
-                <a16:creationId xmlns:a16="http://schemas.microsoft.com/office/drawing/2014/main" id="{31ED1272-7959-4D26-A34C-C227A79E7CA5}"/>
-              </a:ext>
-            </a:extLst>
-          </p:cNvPr>
-          <p:cNvSpPr txBox="1"/>
-          <p:nvPr/>
-        </p:nvSpPr>
-        <p:spPr>
-          <a:xfrm>
-            <a:off x="1249285" y="6230571"/>
-            <a:ext cx="1715534" cy="369332"/>
-          </a:xfrm>
-          <a:prstGeom prst="rect">
-            <a:avLst/>
-          </a:prstGeom>
-          <a:noFill/>
-        </p:spPr>
-        <p:txBody>
-          <a:bodyPr wrap="none" rtlCol="0">
-            <a:spAutoFit/>
-          </a:bodyPr>
-          <a:lstStyle/>
-          <a:p>
-            <a:pPr marL="0" marR="0" lvl="0" indent="0" algn="l" defTabSz="914400" rtl="0" eaLnBrk="1" fontAlgn="auto" latinLnBrk="0" hangingPunct="1">
-              <a:lnSpc>
-                <a:spcPct val="100000"/>
-              </a:lnSpc>
-              <a:spcBef>
-                <a:spcPts val="0"/>
-              </a:spcBef>
-              <a:spcAft>
-                <a:spcPts val="0"/>
-              </a:spcAft>
-              <a:buClrTx/>
-              <a:buSzTx/>
-              <a:buFontTx/>
-              <a:buNone/>
-              <a:tabLst/>
-              <a:defRPr/>
-            </a:pPr>
-            <a:r>
-              <a:rPr kumimoji="0" lang="en-US" sz="1800" b="0" i="0" u="none" strike="noStrike" kern="1200" cap="none" spc="0" normalizeH="0" baseline="0" noProof="0">
-                <a:ln>
-                  <a:noFill/>
-                </a:ln>
-                <a:solidFill>
-                  <a:prstClr val="white"/>
-                </a:solidFill>
-                <a:effectLst/>
-                <a:uLnTx/>
-                <a:uFillTx/>
-                <a:latin typeface="Segoe UI" panose="020B0502040204020203" pitchFamily="34" charset="0"/>
-                <a:ea typeface="+mn-ea"/>
-                <a:cs typeface="Segoe UI" panose="020B0502040204020203" pitchFamily="34" charset="0"/>
-              </a:rPr>
-              <a:t>#MSOpenHack</a:t>
-            </a:r>
-          </a:p>
-        </p:txBody>
-      </p:sp>
-    </p:spTree>
-    <p:extLst>
-      <p:ext uri="{BB962C8B-B14F-4D97-AF65-F5344CB8AC3E}">
-        <p14:creationId xmlns:p14="http://schemas.microsoft.com/office/powerpoint/2010/main" val="172670671"/>
-      </p:ext>
-    </p:extLst>
-  </p:cSld>
-  <p:clrMapOvr>
-    <a:masterClrMapping/>
-  </p:clrMapOvr>
-  <mc:AlternateContent xmlns:mc="http://schemas.openxmlformats.org/markup-compatibility/2006" xmlns:p14="http://schemas.microsoft.com/office/powerpoint/2010/main">
-    <mc:Choice Requires="p14">
-      <p:transition spd="med" p14:dur="700">
-        <p:fade/>
-      </p:transition>
-    </mc:Choice>
-    <mc:Fallback xmlns="">
-      <p:transition spd="med">
-        <p:fade/>
-      </p:transition>
-    </mc:Fallback>
-  </mc:AlternateContent>
-</p:sld>
-</file>
-
-<file path=ppt/slides/slide20.xml><?xml version="1.0" encoding="utf-8"?>
+<file path=ppt/slides/slide21.xml><?xml version="1.0" encoding="utf-8"?>
 <p:sld xmlns:a="http://schemas.openxmlformats.org/drawingml/2006/main" xmlns:r="http://schemas.openxmlformats.org/officeDocument/2006/relationships" xmlns:p="http://schemas.openxmlformats.org/presentationml/2006/main">
   <p:cSld>
     <p:spTree>
@@ -22548,7 +22805,7 @@
 </p:sld>
 </file>
 
-<file path=ppt/slides/slide21.xml><?xml version="1.0" encoding="utf-8"?>
+<file path=ppt/slides/slide22.xml><?xml version="1.0" encoding="utf-8"?>
 <p:sld xmlns:a="http://schemas.openxmlformats.org/drawingml/2006/main" xmlns:r="http://schemas.openxmlformats.org/officeDocument/2006/relationships" xmlns:p="http://schemas.openxmlformats.org/presentationml/2006/main">
   <p:cSld>
     <p:spTree>
@@ -30677,6 +30934,254 @@
       </p:grpSpPr>
       <p:sp>
         <p:nvSpPr>
+          <p:cNvPr id="4" name="TextBox 3">
+            <a:extLst>
+              <a:ext uri="{FF2B5EF4-FFF2-40B4-BE49-F238E27FC236}">
+                <a16:creationId xmlns:a16="http://schemas.microsoft.com/office/drawing/2014/main" id="{DA0FB38D-9E45-4DE0-9311-D6D1C43B2876}"/>
+              </a:ext>
+            </a:extLst>
+          </p:cNvPr>
+          <p:cNvSpPr txBox="1"/>
+          <p:nvPr/>
+        </p:nvSpPr>
+        <p:spPr>
+          <a:xfrm>
+            <a:off x="4911156" y="1346657"/>
+            <a:ext cx="6839105" cy="4401205"/>
+          </a:xfrm>
+          <a:prstGeom prst="rect">
+            <a:avLst/>
+          </a:prstGeom>
+          <a:noFill/>
+          <a:ln>
+            <a:noFill/>
+          </a:ln>
+        </p:spPr>
+        <p:txBody>
+          <a:bodyPr wrap="square">
+            <a:spAutoFit/>
+          </a:bodyPr>
+          <a:lstStyle/>
+          <a:p>
+            <a:pPr marR="0" lvl="0" algn="l" defTabSz="914367" rtl="0" eaLnBrk="1" fontAlgn="auto" latinLnBrk="0" hangingPunct="1">
+              <a:lnSpc>
+                <a:spcPct val="100000"/>
+              </a:lnSpc>
+              <a:spcBef>
+                <a:spcPts val="0"/>
+              </a:spcBef>
+              <a:spcAft>
+                <a:spcPts val="0"/>
+              </a:spcAft>
+              <a:buClrTx/>
+              <a:buSzTx/>
+              <a:tabLst/>
+              <a:defRPr/>
+            </a:pPr>
+            <a:r>
+              <a:rPr lang="en-US" sz="2000" b="0" i="0" dirty="0">
+                <a:solidFill>
+                  <a:srgbClr val="D1D5DB"/>
+                </a:solidFill>
+                <a:effectLst/>
+                <a:latin typeface="Söhne"/>
+              </a:rPr>
+              <a:t>Embeddings are a technique for representing words or data as vectors in a high-dimensional space, allowing us to measure their relatedness.</a:t>
+            </a:r>
+          </a:p>
+          <a:p>
+            <a:pPr marR="0" lvl="0" algn="l" defTabSz="914367" rtl="0" eaLnBrk="1" fontAlgn="auto" latinLnBrk="0" hangingPunct="1">
+              <a:lnSpc>
+                <a:spcPct val="100000"/>
+              </a:lnSpc>
+              <a:spcBef>
+                <a:spcPts val="0"/>
+              </a:spcBef>
+              <a:spcAft>
+                <a:spcPts val="0"/>
+              </a:spcAft>
+              <a:buClrTx/>
+              <a:buSzTx/>
+              <a:tabLst/>
+              <a:defRPr/>
+            </a:pPr>
+            <a:endParaRPr lang="en-US" sz="2000" dirty="0">
+              <a:solidFill>
+                <a:srgbClr val="D1D5DB"/>
+              </a:solidFill>
+              <a:latin typeface="Söhne"/>
+            </a:endParaRPr>
+          </a:p>
+          <a:p>
+            <a:pPr marR="0" lvl="0" algn="l" defTabSz="914367" rtl="0" eaLnBrk="1" fontAlgn="auto" latinLnBrk="0" hangingPunct="1">
+              <a:lnSpc>
+                <a:spcPct val="100000"/>
+              </a:lnSpc>
+              <a:spcBef>
+                <a:spcPts val="0"/>
+              </a:spcBef>
+              <a:spcAft>
+                <a:spcPts val="0"/>
+              </a:spcAft>
+              <a:buClrTx/>
+              <a:buSzTx/>
+              <a:tabLst/>
+              <a:defRPr/>
+            </a:pPr>
+            <a:r>
+              <a:rPr lang="en-US" sz="2000" b="0" i="0" dirty="0">
+                <a:solidFill>
+                  <a:srgbClr val="D1D5DB"/>
+                </a:solidFill>
+                <a:effectLst/>
+                <a:latin typeface="Söhne"/>
+              </a:rPr>
+              <a:t>In AI models, embeddings help computers understand the meaning and context of words or data. To use embeddings, the text is transformed into vectors, and a search query is converted into its vector representation to find similar vectors. This process resembles searching on a search engine, providing ranked matches based on similarity.</a:t>
+            </a:r>
+          </a:p>
+          <a:p>
+            <a:pPr marR="0" lvl="0" algn="l" defTabSz="914367" rtl="0" eaLnBrk="1" fontAlgn="auto" latinLnBrk="0" hangingPunct="1">
+              <a:lnSpc>
+                <a:spcPct val="100000"/>
+              </a:lnSpc>
+              <a:spcBef>
+                <a:spcPts val="0"/>
+              </a:spcBef>
+              <a:spcAft>
+                <a:spcPts val="0"/>
+              </a:spcAft>
+              <a:buClrTx/>
+              <a:buSzTx/>
+              <a:tabLst/>
+              <a:defRPr/>
+            </a:pPr>
+            <a:endParaRPr lang="en-US" sz="2000" dirty="0">
+              <a:solidFill>
+                <a:srgbClr val="D1D5DB"/>
+              </a:solidFill>
+              <a:latin typeface="Söhne"/>
+            </a:endParaRPr>
+          </a:p>
+          <a:p>
+            <a:pPr marR="0" lvl="0" algn="l" defTabSz="914367" rtl="0" eaLnBrk="1" fontAlgn="auto" latinLnBrk="0" hangingPunct="1">
+              <a:lnSpc>
+                <a:spcPct val="100000"/>
+              </a:lnSpc>
+              <a:spcBef>
+                <a:spcPts val="0"/>
+              </a:spcBef>
+              <a:spcAft>
+                <a:spcPts val="0"/>
+              </a:spcAft>
+              <a:buClrTx/>
+              <a:buSzTx/>
+              <a:tabLst/>
+              <a:defRPr/>
+            </a:pPr>
+            <a:r>
+              <a:rPr lang="en-US" sz="2000" b="0" i="0" dirty="0">
+                <a:solidFill>
+                  <a:srgbClr val="D1D5DB"/>
+                </a:solidFill>
+                <a:effectLst/>
+                <a:latin typeface="Söhne"/>
+              </a:rPr>
+              <a:t>Azure OpenAI embeddings utilize cosine similarity, measuring the angle between vectors in a multi-dimensional space, even when documents are far apart by Euclidean distance.</a:t>
+            </a:r>
+            <a:endParaRPr kumimoji="0" lang="en-US" sz="2000" b="0" i="0" u="none" strike="noStrike" kern="1200" cap="none" spc="0" normalizeH="0" baseline="0" noProof="0" dirty="0">
+              <a:ln>
+                <a:noFill/>
+              </a:ln>
+              <a:solidFill>
+                <a:srgbClr val="FFFFFF"/>
+              </a:solidFill>
+              <a:effectLst/>
+              <a:uLnTx/>
+              <a:uFillTx/>
+              <a:latin typeface="Segoe UI"/>
+              <a:ea typeface="+mn-ea"/>
+              <a:cs typeface="+mn-cs"/>
+            </a:endParaRPr>
+          </a:p>
+        </p:txBody>
+      </p:sp>
+      <p:sp>
+        <p:nvSpPr>
+          <p:cNvPr id="6" name="Title 5">
+            <a:extLst>
+              <a:ext uri="{FF2B5EF4-FFF2-40B4-BE49-F238E27FC236}">
+                <a16:creationId xmlns:a16="http://schemas.microsoft.com/office/drawing/2014/main" id="{A6D2C8AF-4227-413C-A201-3144BCB37FD7}"/>
+              </a:ext>
+            </a:extLst>
+          </p:cNvPr>
+          <p:cNvSpPr>
+            <a:spLocks noGrp="1"/>
+          </p:cNvSpPr>
+          <p:nvPr>
+            <p:ph type="title"/>
+          </p:nvPr>
+        </p:nvSpPr>
+        <p:spPr>
+          <a:xfrm>
+            <a:off x="1996018" y="3213556"/>
+            <a:ext cx="2592915" cy="861774"/>
+          </a:xfrm>
+        </p:spPr>
+        <p:txBody>
+          <a:bodyPr/>
+          <a:lstStyle/>
+          <a:p>
+            <a:r>
+              <a:rPr lang="en-US" sz="2800" dirty="0"/>
+              <a:t>What are embeddings?</a:t>
+            </a:r>
+          </a:p>
+        </p:txBody>
+      </p:sp>
+    </p:spTree>
+    <p:extLst>
+      <p:ext uri="{BB962C8B-B14F-4D97-AF65-F5344CB8AC3E}">
+        <p14:creationId xmlns:p14="http://schemas.microsoft.com/office/powerpoint/2010/main" val="3490564973"/>
+      </p:ext>
+    </p:extLst>
+  </p:cSld>
+  <p:clrMapOvr>
+    <a:masterClrMapping/>
+  </p:clrMapOvr>
+  <mc:AlternateContent xmlns:mc="http://schemas.openxmlformats.org/markup-compatibility/2006">
+    <mc:Choice xmlns:p14="http://schemas.microsoft.com/office/powerpoint/2010/main" Requires="p14">
+      <p:transition spd="med" p14:dur="700">
+        <p:fade/>
+      </p:transition>
+    </mc:Choice>
+    <mc:Fallback>
+      <p:transition spd="med">
+        <p:fade/>
+      </p:transition>
+    </mc:Fallback>
+  </mc:AlternateContent>
+</p:sld>
+</file>
+
+<file path=ppt/slides/slide9.xml><?xml version="1.0" encoding="utf-8"?>
+<p:sld xmlns:a="http://schemas.openxmlformats.org/drawingml/2006/main" xmlns:r="http://schemas.openxmlformats.org/officeDocument/2006/relationships" xmlns:p="http://schemas.openxmlformats.org/presentationml/2006/main">
+  <p:cSld>
+    <p:spTree>
+      <p:nvGrpSpPr>
+        <p:cNvPr id="1" name=""/>
+        <p:cNvGrpSpPr/>
+        <p:nvPr/>
+      </p:nvGrpSpPr>
+      <p:grpSpPr>
+        <a:xfrm>
+          <a:off x="0" y="0"/>
+          <a:ext cx="0" cy="0"/>
+          <a:chOff x="0" y="0"/>
+          <a:chExt cx="0" cy="0"/>
+        </a:xfrm>
+      </p:grpSpPr>
+      <p:sp>
+        <p:nvSpPr>
           <p:cNvPr id="21" name="TextBox 20">
             <a:extLst>
               <a:ext uri="{FF2B5EF4-FFF2-40B4-BE49-F238E27FC236}">
@@ -30885,118 +31390,6 @@
   <p:transition>
     <p:fade/>
   </p:transition>
-</p:sld>
-</file>
-
-<file path=ppt/slides/slide9.xml><?xml version="1.0" encoding="utf-8"?>
-<p:sld xmlns:a="http://schemas.openxmlformats.org/drawingml/2006/main" xmlns:r="http://schemas.openxmlformats.org/officeDocument/2006/relationships" xmlns:p="http://schemas.openxmlformats.org/presentationml/2006/main">
-  <p:cSld>
-    <p:spTree>
-      <p:nvGrpSpPr>
-        <p:cNvPr id="1" name=""/>
-        <p:cNvGrpSpPr/>
-        <p:nvPr/>
-      </p:nvGrpSpPr>
-      <p:grpSpPr>
-        <a:xfrm>
-          <a:off x="0" y="0"/>
-          <a:ext cx="0" cy="0"/>
-          <a:chOff x="0" y="0"/>
-          <a:chExt cx="0" cy="0"/>
-        </a:xfrm>
-      </p:grpSpPr>
-      <p:sp>
-        <p:nvSpPr>
-          <p:cNvPr id="9" name="Title 8">
-            <a:extLst>
-              <a:ext uri="{FF2B5EF4-FFF2-40B4-BE49-F238E27FC236}">
-                <a16:creationId xmlns:a16="http://schemas.microsoft.com/office/drawing/2014/main" id="{A4EA16FA-8D26-451C-9337-113E6EAE3CB9}"/>
-              </a:ext>
-            </a:extLst>
-          </p:cNvPr>
-          <p:cNvSpPr>
-            <a:spLocks noGrp="1"/>
-          </p:cNvSpPr>
-          <p:nvPr>
-            <p:ph type="title"/>
-          </p:nvPr>
-        </p:nvSpPr>
-        <p:spPr/>
-        <p:txBody>
-          <a:bodyPr/>
-          <a:lstStyle/>
-          <a:p>
-            <a:r>
-              <a:rPr lang="en-US" dirty="0">
-                <a:solidFill>
-                  <a:srgbClr val="FFFFFF"/>
-                </a:solidFill>
-                <a:cs typeface="Segoe UI" panose="020B0502040204020203" pitchFamily="34" charset="0"/>
-              </a:rPr>
-              <a:t>Bring Your Own Data to ChatGPT</a:t>
-            </a:r>
-            <a:endParaRPr lang="en-US" dirty="0"/>
-          </a:p>
-        </p:txBody>
-      </p:sp>
-      <p:sp>
-        <p:nvSpPr>
-          <p:cNvPr id="10" name="Subtitle 9">
-            <a:extLst>
-              <a:ext uri="{FF2B5EF4-FFF2-40B4-BE49-F238E27FC236}">
-                <a16:creationId xmlns:a16="http://schemas.microsoft.com/office/drawing/2014/main" id="{44CCF6FC-DF3C-472E-916C-66140B389074}"/>
-              </a:ext>
-            </a:extLst>
-          </p:cNvPr>
-          <p:cNvSpPr>
-            <a:spLocks noGrp="1"/>
-          </p:cNvSpPr>
-          <p:nvPr>
-            <p:ph type="subTitle" idx="1"/>
-          </p:nvPr>
-        </p:nvSpPr>
-        <p:spPr/>
-        <p:txBody>
-          <a:bodyPr/>
-          <a:lstStyle/>
-          <a:p>
-            <a:r>
-              <a:rPr lang="en-US"/>
-              <a:t>Challenge walkthrough for </a:t>
-            </a:r>
-            <a:r>
-              <a:rPr lang="en-US" b="1">
-                <a:solidFill>
-                  <a:schemeClr val="accent1"/>
-                </a:solidFill>
-              </a:rPr>
-              <a:t>coaches</a:t>
-            </a:r>
-          </a:p>
-        </p:txBody>
-      </p:sp>
-    </p:spTree>
-    <p:extLst>
-      <p:ext uri="{BB962C8B-B14F-4D97-AF65-F5344CB8AC3E}">
-        <p14:creationId xmlns:p14="http://schemas.microsoft.com/office/powerpoint/2010/main" val="2648741953"/>
-      </p:ext>
-    </p:extLst>
-  </p:cSld>
-  <p:clrMapOvr>
-    <a:masterClrMapping/>
-  </p:clrMapOvr>
-  <mc:AlternateContent xmlns:mc="http://schemas.openxmlformats.org/markup-compatibility/2006" xmlns:p14="http://schemas.microsoft.com/office/powerpoint/2010/main">
-    <mc:Choice Requires="p14">
-      <p:transition spd="med" p14:dur="700">
-        <p:fade/>
-      </p:transition>
-    </mc:Choice>
-    <mc:Fallback xmlns="">
-      <p:transition spd="med">
-        <p:fade/>
-      </p:transition>
-    </mc:Fallback>
-  </mc:AlternateContent>
 </p:sld>
 </file>
 
@@ -31873,6 +32266,33 @@
 </file>
 
 <file path=customXml/item2.xml><?xml version="1.0" encoding="utf-8"?>
+<p:properties xmlns:p="http://schemas.microsoft.com/office/2006/metadata/properties" xmlns:xsi="http://www.w3.org/2001/XMLSchema-instance" xmlns:pc="http://schemas.microsoft.com/office/infopath/2007/PartnerControls">
+  <documentManagement>
+    <MediaServiceKeyPoints xmlns="675661ce-a921-4ef4-be83-dd19f3c4cc86" xsi:nil="true"/>
+    <MaterialType xmlns="675661ce-a921-4ef4-be83-dd19f3c4cc86">
+      <Value>Presentation Ready Deck</Value>
+    </MaterialType>
+    <Description xmlns="675661ce-a921-4ef4-be83-dd19f3c4cc86" xsi:nil="true"/>
+    <Tag xmlns="675661ce-a921-4ef4-be83-dd19f3c4cc86">
+      <Value>PM</Value>
+      <Value>Lead Coach</Value>
+      <Value>Coach</Value>
+    </Tag>
+    <OHOrder xmlns="675661ce-a921-4ef4-be83-dd19f3c4cc86" xsi:nil="true"/>
+    <Internal_x0020_MSFT xmlns="675661ce-a921-4ef4-be83-dd19f3c4cc86" xsi:nil="true"/>
+    <OrderNo_x002e_ xmlns="675661ce-a921-4ef4-be83-dd19f3c4cc86" xsi:nil="true"/>
+    <Sequence_x0020_of_x0020_Material xmlns="675661ce-a921-4ef4-be83-dd19f3c4cc86">4. Day of Event</Sequence_x0020_of_x0020_Material>
+    <_ip_UnifiedCompliancePolicyUIAction xmlns="http://schemas.microsoft.com/sharepoint/v3" xsi:nil="true"/>
+    <_ip_UnifiedCompliancePolicyProperties xmlns="http://schemas.microsoft.com/sharepoint/v3" xsi:nil="true"/>
+    <lcf76f155ced4ddcb4097134ff3c332f xmlns="675661ce-a921-4ef4-be83-dd19f3c4cc86">
+      <Terms xmlns="http://schemas.microsoft.com/office/infopath/2007/PartnerControls"/>
+    </lcf76f155ced4ddcb4097134ff3c332f>
+    <TaxCatchAll xmlns="230e9df3-be65-4c73-a93b-d1236ebd677e" xsi:nil="true"/>
+  </documentManagement>
+</p:properties>
+</file>
+
+<file path=customXml/item3.xml><?xml version="1.0" encoding="utf-8"?>
 <ct:contentTypeSchema xmlns:ct="http://schemas.microsoft.com/office/2006/metadata/contentType" xmlns:ma="http://schemas.microsoft.com/office/2006/metadata/properties/metaAttributes" ct:_="" ma:_="" ma:contentTypeName="Document" ma:contentTypeID="0x010100262D61D9A00A5041B210DE23A0FE8625" ma:contentTypeVersion="24" ma:contentTypeDescription="Create a new document." ma:contentTypeScope="" ma:versionID="839773bd44a51a311d8e2846b7142e4b">
   <xsd:schema xmlns:xsd="http://www.w3.org/2001/XMLSchema" xmlns:xs="http://www.w3.org/2001/XMLSchema" xmlns:p="http://schemas.microsoft.com/office/2006/metadata/properties" xmlns:ns1="http://schemas.microsoft.com/sharepoint/v3" xmlns:ns2="675661ce-a921-4ef4-be83-dd19f3c4cc86" xmlns:ns3="4343a8c8-d2d9-429e-8dd3-28f02b2ba4f5" xmlns:ns4="230e9df3-be65-4c73-a93b-d1236ebd677e" targetNamespace="http://schemas.microsoft.com/office/2006/metadata/properties" ma:root="true" ma:fieldsID="7f43399919387af8e2a3ad2b19a547db" ns1:_="" ns2:_="" ns3:_="" ns4:_="">
     <xsd:import namespace="http://schemas.microsoft.com/sharepoint/v3"/>
@@ -32212,33 +32632,6 @@
 </ct:contentTypeSchema>
 </file>
 
-<file path=customXml/item3.xml><?xml version="1.0" encoding="utf-8"?>
-<p:properties xmlns:p="http://schemas.microsoft.com/office/2006/metadata/properties" xmlns:xsi="http://www.w3.org/2001/XMLSchema-instance" xmlns:pc="http://schemas.microsoft.com/office/infopath/2007/PartnerControls">
-  <documentManagement>
-    <MediaServiceKeyPoints xmlns="675661ce-a921-4ef4-be83-dd19f3c4cc86" xsi:nil="true"/>
-    <MaterialType xmlns="675661ce-a921-4ef4-be83-dd19f3c4cc86">
-      <Value>Presentation Ready Deck</Value>
-    </MaterialType>
-    <Description xmlns="675661ce-a921-4ef4-be83-dd19f3c4cc86" xsi:nil="true"/>
-    <Tag xmlns="675661ce-a921-4ef4-be83-dd19f3c4cc86">
-      <Value>PM</Value>
-      <Value>Lead Coach</Value>
-      <Value>Coach</Value>
-    </Tag>
-    <OHOrder xmlns="675661ce-a921-4ef4-be83-dd19f3c4cc86" xsi:nil="true"/>
-    <Internal_x0020_MSFT xmlns="675661ce-a921-4ef4-be83-dd19f3c4cc86" xsi:nil="true"/>
-    <OrderNo_x002e_ xmlns="675661ce-a921-4ef4-be83-dd19f3c4cc86" xsi:nil="true"/>
-    <Sequence_x0020_of_x0020_Material xmlns="675661ce-a921-4ef4-be83-dd19f3c4cc86">4. Day of Event</Sequence_x0020_of_x0020_Material>
-    <_ip_UnifiedCompliancePolicyUIAction xmlns="http://schemas.microsoft.com/sharepoint/v3" xsi:nil="true"/>
-    <_ip_UnifiedCompliancePolicyProperties xmlns="http://schemas.microsoft.com/sharepoint/v3" xsi:nil="true"/>
-    <lcf76f155ced4ddcb4097134ff3c332f xmlns="675661ce-a921-4ef4-be83-dd19f3c4cc86">
-      <Terms xmlns="http://schemas.microsoft.com/office/infopath/2007/PartnerControls"/>
-    </lcf76f155ced4ddcb4097134ff3c332f>
-    <TaxCatchAll xmlns="230e9df3-be65-4c73-a93b-d1236ebd677e" xsi:nil="true"/>
-  </documentManagement>
-</p:properties>
-</file>
-
 <file path=customXml/itemProps1.xml><?xml version="1.0" encoding="utf-8"?>
 <ds:datastoreItem xmlns:ds="http://schemas.openxmlformats.org/officeDocument/2006/customXml" ds:itemID="{91696345-23F8-4CDB-8A31-BEF0BEB16805}">
   <ds:schemaRefs>
@@ -32248,6 +32641,25 @@
 </file>
 
 <file path=customXml/itemProps2.xml><?xml version="1.0" encoding="utf-8"?>
+<ds:datastoreItem xmlns:ds="http://schemas.openxmlformats.org/officeDocument/2006/customXml" ds:itemID="{0A9086BA-F6B1-41F0-8458-5D968EBBF04E}">
+  <ds:schemaRefs>
+    <ds:schemaRef ds:uri="http://schemas.microsoft.com/office/2006/metadata/properties"/>
+    <ds:schemaRef ds:uri="http://purl.org/dc/elements/1.1/"/>
+    <ds:schemaRef ds:uri="http://purl.org/dc/dcmitype/"/>
+    <ds:schemaRef ds:uri="http://www.w3.org/XML/1998/namespace"/>
+    <ds:schemaRef ds:uri="http://schemas.microsoft.com/sharepoint/v3"/>
+    <ds:schemaRef ds:uri="4343a8c8-d2d9-429e-8dd3-28f02b2ba4f5"/>
+    <ds:schemaRef ds:uri="http://schemas.microsoft.com/office/2006/documentManagement/types"/>
+    <ds:schemaRef ds:uri="http://schemas.microsoft.com/office/infopath/2007/PartnerControls"/>
+    <ds:schemaRef ds:uri="http://schemas.openxmlformats.org/package/2006/metadata/core-properties"/>
+    <ds:schemaRef ds:uri="675661ce-a921-4ef4-be83-dd19f3c4cc86"/>
+    <ds:schemaRef ds:uri="http://purl.org/dc/terms/"/>
+    <ds:schemaRef ds:uri="230e9df3-be65-4c73-a93b-d1236ebd677e"/>
+  </ds:schemaRefs>
+</ds:datastoreItem>
+</file>
+
+<file path=customXml/itemProps3.xml><?xml version="1.0" encoding="utf-8"?>
 <ds:datastoreItem xmlns:ds="http://schemas.openxmlformats.org/officeDocument/2006/customXml" ds:itemID="{D1157EB0-1AB2-459D-92B4-E00E8DCC06DF}">
   <ds:schemaRefs>
     <ds:schemaRef ds:uri="http://schemas.microsoft.com/office/2006/metadata/contentType"/>
@@ -32268,25 +32680,6 @@
 </ds:datastoreItem>
 </file>
 
-<file path=customXml/itemProps3.xml><?xml version="1.0" encoding="utf-8"?>
-<ds:datastoreItem xmlns:ds="http://schemas.openxmlformats.org/officeDocument/2006/customXml" ds:itemID="{0A9086BA-F6B1-41F0-8458-5D968EBBF04E}">
-  <ds:schemaRefs>
-    <ds:schemaRef ds:uri="http://schemas.microsoft.com/office/2006/metadata/properties"/>
-    <ds:schemaRef ds:uri="http://purl.org/dc/elements/1.1/"/>
-    <ds:schemaRef ds:uri="http://purl.org/dc/dcmitype/"/>
-    <ds:schemaRef ds:uri="http://www.w3.org/XML/1998/namespace"/>
-    <ds:schemaRef ds:uri="http://schemas.microsoft.com/sharepoint/v3"/>
-    <ds:schemaRef ds:uri="4343a8c8-d2d9-429e-8dd3-28f02b2ba4f5"/>
-    <ds:schemaRef ds:uri="http://schemas.microsoft.com/office/2006/documentManagement/types"/>
-    <ds:schemaRef ds:uri="http://schemas.microsoft.com/office/infopath/2007/PartnerControls"/>
-    <ds:schemaRef ds:uri="http://schemas.openxmlformats.org/package/2006/metadata/core-properties"/>
-    <ds:schemaRef ds:uri="675661ce-a921-4ef4-be83-dd19f3c4cc86"/>
-    <ds:schemaRef ds:uri="http://purl.org/dc/terms/"/>
-    <ds:schemaRef ds:uri="230e9df3-be65-4c73-a93b-d1236ebd677e"/>
-  </ds:schemaRefs>
-</ds:datastoreItem>
-</file>
-
 <file path=docMetadata/LabelInfo.xml><?xml version="1.0" encoding="utf-8"?>
 <clbl:labelList xmlns:clbl="http://schemas.microsoft.com/office/2020/mipLabelMetadata">
   <clbl:label id="{f42aa342-8706-4288-bd11-ebb85995028c}" enabled="1" method="Privileged" siteId="{72f988bf-86f1-41af-91ab-2d7cd011db47}" removed="0"/>

</xml_diff>